<commit_message>
More updates to the taxonomy
</commit_message>
<xml_diff>
--- a/paper/figures/BlockchainFlowchart.pptx
+++ b/paper/figures/BlockchainFlowchart.pptx
@@ -5000,7 +5000,7 @@
         <p:spPr>
           <a:xfrm>
             <a:off x="7232019" y="4534458"/>
-            <a:ext cx="1568731" cy="923330"/>
+            <a:ext cx="1568731" cy="646331"/>
           </a:xfrm>
           <a:prstGeom prst="rect">
             <a:avLst/>
@@ -5033,7 +5033,7 @@
                   <a:schemeClr val="tx1"/>
                 </a:solidFill>
               </a:rPr>
-              <a:t>Monitored database with</a:t>
+              <a:t>Database with</a:t>
             </a:r>
             <a:br>
               <a:rPr lang="en-US" dirty="0">
@@ -5196,7 +5196,7 @@
         <p:spPr>
           <a:xfrm>
             <a:off x="10438623" y="4519942"/>
-            <a:ext cx="1549619" cy="1200329"/>
+            <a:ext cx="1549619" cy="923330"/>
           </a:xfrm>
           <a:prstGeom prst="rect">
             <a:avLst/>
@@ -5229,7 +5229,7 @@
                   <a:schemeClr val="tx1"/>
                 </a:solidFill>
               </a:rPr>
-              <a:t>Replicated monitored database with consensus</a:t>
+              <a:t>Replicated database with consensus</a:t>
             </a:r>
           </a:p>
         </p:txBody>
@@ -5306,7 +5306,7 @@
         <p:spPr>
           <a:xfrm>
             <a:off x="5976630" y="4412859"/>
-            <a:ext cx="1255389" cy="583264"/>
+            <a:ext cx="1255389" cy="444765"/>
           </a:xfrm>
           <a:prstGeom prst="straightConnector1">
             <a:avLst/>
@@ -5346,8 +5346,8 @@
           <p:nvPr/>
         </p:nvSpPr>
         <p:spPr>
-          <a:xfrm rot="1563826">
-            <a:off x="5789219" y="4430404"/>
+          <a:xfrm rot="1185460">
+            <a:off x="5870499" y="4369444"/>
             <a:ext cx="1562094" cy="307777"/>
           </a:xfrm>
           <a:prstGeom prst="rect">

</xml_diff>

<commit_message>
Updating author information and chart.
</commit_message>
<xml_diff>
--- a/paper/figures/BlockchainFlowchart.pptx
+++ b/paper/figures/BlockchainFlowchart.pptx
@@ -197,7 +197,7 @@
           <a:p>
             <a:fld id="{02994FF3-6FCA-4117-81FE-5BEF2B3E97C9}" type="datetimeFigureOut">
               <a:rPr lang="en-US" smtClean="0"/>
-              <a:t>8/21/2018</a:t>
+              <a:t>9/3/18</a:t>
             </a:fld>
             <a:endParaRPr lang="en-US"/>
           </a:p>
@@ -719,7 +719,7 @@
           <a:p>
             <a:fld id="{ABCA0093-4CAB-4769-97E2-43E0798F6417}" type="datetimeFigureOut">
               <a:rPr lang="en-US" smtClean="0"/>
-              <a:t>8/21/2018</a:t>
+              <a:t>9/3/18</a:t>
             </a:fld>
             <a:endParaRPr lang="en-US"/>
           </a:p>
@@ -917,7 +917,7 @@
           <a:p>
             <a:fld id="{ABCA0093-4CAB-4769-97E2-43E0798F6417}" type="datetimeFigureOut">
               <a:rPr lang="en-US" smtClean="0"/>
-              <a:t>8/21/2018</a:t>
+              <a:t>9/3/18</a:t>
             </a:fld>
             <a:endParaRPr lang="en-US"/>
           </a:p>
@@ -1125,7 +1125,7 @@
           <a:p>
             <a:fld id="{ABCA0093-4CAB-4769-97E2-43E0798F6417}" type="datetimeFigureOut">
               <a:rPr lang="en-US" smtClean="0"/>
-              <a:t>8/21/2018</a:t>
+              <a:t>9/3/18</a:t>
             </a:fld>
             <a:endParaRPr lang="en-US"/>
           </a:p>
@@ -1323,7 +1323,7 @@
           <a:p>
             <a:fld id="{ABCA0093-4CAB-4769-97E2-43E0798F6417}" type="datetimeFigureOut">
               <a:rPr lang="en-US" smtClean="0"/>
-              <a:t>8/21/2018</a:t>
+              <a:t>9/3/18</a:t>
             </a:fld>
             <a:endParaRPr lang="en-US"/>
           </a:p>
@@ -1598,7 +1598,7 @@
           <a:p>
             <a:fld id="{ABCA0093-4CAB-4769-97E2-43E0798F6417}" type="datetimeFigureOut">
               <a:rPr lang="en-US" smtClean="0"/>
-              <a:t>8/21/2018</a:t>
+              <a:t>9/3/18</a:t>
             </a:fld>
             <a:endParaRPr lang="en-US"/>
           </a:p>
@@ -1863,7 +1863,7 @@
           <a:p>
             <a:fld id="{ABCA0093-4CAB-4769-97E2-43E0798F6417}" type="datetimeFigureOut">
               <a:rPr lang="en-US" smtClean="0"/>
-              <a:t>8/21/2018</a:t>
+              <a:t>9/3/18</a:t>
             </a:fld>
             <a:endParaRPr lang="en-US"/>
           </a:p>
@@ -2275,7 +2275,7 @@
           <a:p>
             <a:fld id="{ABCA0093-4CAB-4769-97E2-43E0798F6417}" type="datetimeFigureOut">
               <a:rPr lang="en-US" smtClean="0"/>
-              <a:t>8/21/2018</a:t>
+              <a:t>9/3/18</a:t>
             </a:fld>
             <a:endParaRPr lang="en-US"/>
           </a:p>
@@ -2416,7 +2416,7 @@
           <a:p>
             <a:fld id="{ABCA0093-4CAB-4769-97E2-43E0798F6417}" type="datetimeFigureOut">
               <a:rPr lang="en-US" smtClean="0"/>
-              <a:t>8/21/2018</a:t>
+              <a:t>9/3/18</a:t>
             </a:fld>
             <a:endParaRPr lang="en-US"/>
           </a:p>
@@ -2529,7 +2529,7 @@
           <a:p>
             <a:fld id="{ABCA0093-4CAB-4769-97E2-43E0798F6417}" type="datetimeFigureOut">
               <a:rPr lang="en-US" smtClean="0"/>
-              <a:t>8/21/2018</a:t>
+              <a:t>9/3/18</a:t>
             </a:fld>
             <a:endParaRPr lang="en-US"/>
           </a:p>
@@ -2840,7 +2840,7 @@
           <a:p>
             <a:fld id="{ABCA0093-4CAB-4769-97E2-43E0798F6417}" type="datetimeFigureOut">
               <a:rPr lang="en-US" smtClean="0"/>
-              <a:t>8/21/2018</a:t>
+              <a:t>9/3/18</a:t>
             </a:fld>
             <a:endParaRPr lang="en-US"/>
           </a:p>
@@ -3128,7 +3128,7 @@
           <a:p>
             <a:fld id="{ABCA0093-4CAB-4769-97E2-43E0798F6417}" type="datetimeFigureOut">
               <a:rPr lang="en-US" smtClean="0"/>
-              <a:t>8/21/2018</a:t>
+              <a:t>9/3/18</a:t>
             </a:fld>
             <a:endParaRPr lang="en-US"/>
           </a:p>
@@ -3369,7 +3369,7 @@
           <a:p>
             <a:fld id="{ABCA0093-4CAB-4769-97E2-43E0798F6417}" type="datetimeFigureOut">
               <a:rPr lang="en-US" smtClean="0"/>
-              <a:t>8/21/2018</a:t>
+              <a:t>9/3/18</a:t>
             </a:fld>
             <a:endParaRPr lang="en-US"/>
           </a:p>
@@ -3788,10 +3788,10 @@
       </p:grpSpPr>
       <p:sp>
         <p:nvSpPr>
-          <p:cNvPr id="30" name="TextBox 29">
-            <a:extLst>
-              <a:ext uri="{FF2B5EF4-FFF2-40B4-BE49-F238E27FC236}">
-                <a16:creationId xmlns:a16="http://schemas.microsoft.com/office/drawing/2014/main" id="{769CF658-1BE1-4D98-AF75-37145110B7AF}"/>
+          <p:cNvPr id="2" name="TextBox 1">
+            <a:extLst>
+              <a:ext uri="{FF2B5EF4-FFF2-40B4-BE49-F238E27FC236}">
+                <a16:creationId xmlns:a16="http://schemas.microsoft.com/office/drawing/2014/main" id="{1C50736D-BE8F-4187-B3AF-29785E04E245}"/>
               </a:ext>
             </a:extLst>
           </p:cNvPr>
@@ -3799,9 +3799,9 @@
           <p:nvPr/>
         </p:nvSpPr>
         <p:spPr>
-          <a:xfrm rot="1147443">
-            <a:off x="3319343" y="4856116"/>
-            <a:ext cx="1562094" cy="307777"/>
+          <a:xfrm>
+            <a:off x="-25610" y="5790"/>
+            <a:ext cx="2047871" cy="646331"/>
           </a:xfrm>
           <a:prstGeom prst="rect">
             <a:avLst/>
@@ -3816,18 +3816,18 @@
           <a:p>
             <a:pPr algn="ctr"/>
             <a:r>
-              <a:rPr lang="en-US" sz="1400" b="1" dirty="0"/>
-              <a:t>System</a:t>
-            </a:r>
-          </a:p>
-        </p:txBody>
-      </p:sp>
-      <p:sp>
-        <p:nvSpPr>
-          <p:cNvPr id="27" name="TextBox 26">
-            <a:extLst>
-              <a:ext uri="{FF2B5EF4-FFF2-40B4-BE49-F238E27FC236}">
-                <a16:creationId xmlns:a16="http://schemas.microsoft.com/office/drawing/2014/main" id="{53054EEA-F0D5-4F31-8852-FFD0D1C89C3B}"/>
+              <a:rPr lang="en-US" dirty="0"/>
+              <a:t>What is the governance model?</a:t>
+            </a:r>
+          </a:p>
+        </p:txBody>
+      </p:sp>
+      <p:sp>
+        <p:nvSpPr>
+          <p:cNvPr id="3" name="TextBox 2">
+            <a:extLst>
+              <a:ext uri="{FF2B5EF4-FFF2-40B4-BE49-F238E27FC236}">
+                <a16:creationId xmlns:a16="http://schemas.microsoft.com/office/drawing/2014/main" id="{D310F0D7-C2D9-43F1-B6AC-C40B3C90CF92}"/>
               </a:ext>
             </a:extLst>
           </p:cNvPr>
@@ -3835,9 +3835,9 @@
           <p:nvPr/>
         </p:nvSpPr>
         <p:spPr>
-          <a:xfrm rot="20286890">
-            <a:off x="2984205" y="4338680"/>
-            <a:ext cx="1562094" cy="307777"/>
+          <a:xfrm>
+            <a:off x="2999628" y="-6018"/>
+            <a:ext cx="1782269" cy="646331"/>
           </a:xfrm>
           <a:prstGeom prst="rect">
             <a:avLst/>
@@ -3852,18 +3852,18 @@
           <a:p>
             <a:pPr algn="ctr"/>
             <a:r>
-              <a:rPr lang="en-US" sz="1400" b="1" dirty="0"/>
-              <a:t>Maintainer</a:t>
-            </a:r>
-          </a:p>
-        </p:txBody>
-      </p:sp>
-      <p:sp>
-        <p:nvSpPr>
-          <p:cNvPr id="2" name="TextBox 1">
-            <a:extLst>
-              <a:ext uri="{FF2B5EF4-FFF2-40B4-BE49-F238E27FC236}">
-                <a16:creationId xmlns:a16="http://schemas.microsoft.com/office/drawing/2014/main" id="{1C50736D-BE8F-4187-B3AF-29785E04E245}"/>
+              <a:rPr lang="en-US" b="1" dirty="0"/>
+              <a:t>Where is the root of trust?</a:t>
+            </a:r>
+          </a:p>
+        </p:txBody>
+      </p:sp>
+      <p:sp>
+        <p:nvSpPr>
+          <p:cNvPr id="4" name="TextBox 3">
+            <a:extLst>
+              <a:ext uri="{FF2B5EF4-FFF2-40B4-BE49-F238E27FC236}">
+                <a16:creationId xmlns:a16="http://schemas.microsoft.com/office/drawing/2014/main" id="{DCAA16A1-9A77-4CDD-95E3-AF73070FDC21}"/>
               </a:ext>
             </a:extLst>
           </p:cNvPr>
@@ -3872,8 +3872,8 @@
         </p:nvSpPr>
         <p:spPr>
           <a:xfrm>
-            <a:off x="172088" y="161409"/>
-            <a:ext cx="2047871" cy="646331"/>
+            <a:off x="5665230" y="-6018"/>
+            <a:ext cx="2279560" cy="369332"/>
           </a:xfrm>
           <a:prstGeom prst="rect">
             <a:avLst/>
@@ -3888,18 +3888,18 @@
           <a:p>
             <a:pPr algn="ctr"/>
             <a:r>
-              <a:rPr lang="en-US" dirty="0"/>
-              <a:t>What is the governance model?</a:t>
-            </a:r>
-          </a:p>
-        </p:txBody>
-      </p:sp>
-      <p:sp>
-        <p:nvSpPr>
-          <p:cNvPr id="3" name="TextBox 2">
-            <a:extLst>
-              <a:ext uri="{FF2B5EF4-FFF2-40B4-BE49-F238E27FC236}">
-                <a16:creationId xmlns:a16="http://schemas.microsoft.com/office/drawing/2014/main" id="{D310F0D7-C2D9-43F1-B6AC-C40B3C90CF92}"/>
+              <a:rPr lang="en-US" i="1" dirty="0"/>
+              <a:t>What is auditable?</a:t>
+            </a:r>
+          </a:p>
+        </p:txBody>
+      </p:sp>
+      <p:sp>
+        <p:nvSpPr>
+          <p:cNvPr id="5" name="TextBox 4">
+            <a:extLst>
+              <a:ext uri="{FF2B5EF4-FFF2-40B4-BE49-F238E27FC236}">
+                <a16:creationId xmlns:a16="http://schemas.microsoft.com/office/drawing/2014/main" id="{0B0B4B4F-2CD4-481C-A198-6EDCDC3FFC15}"/>
               </a:ext>
             </a:extLst>
           </p:cNvPr>
@@ -3908,8 +3908,8 @@
         </p:nvSpPr>
         <p:spPr>
           <a:xfrm>
-            <a:off x="2876923" y="161409"/>
-            <a:ext cx="1782269" cy="646331"/>
+            <a:off x="8797052" y="3316"/>
+            <a:ext cx="1844412" cy="646331"/>
           </a:xfrm>
           <a:prstGeom prst="rect">
             <a:avLst/>
@@ -3924,18 +3924,18 @@
           <a:p>
             <a:pPr algn="ctr"/>
             <a:r>
-              <a:rPr lang="en-US" b="1" dirty="0"/>
-              <a:t>Where is the root of trust?</a:t>
-            </a:r>
-          </a:p>
-        </p:txBody>
-      </p:sp>
-      <p:sp>
-        <p:nvSpPr>
-          <p:cNvPr id="4" name="TextBox 3">
-            <a:extLst>
-              <a:ext uri="{FF2B5EF4-FFF2-40B4-BE49-F238E27FC236}">
-                <a16:creationId xmlns:a16="http://schemas.microsoft.com/office/drawing/2014/main" id="{DCAA16A1-9A77-4CDD-95E3-AF73070FDC21}"/>
+              <a:rPr lang="en-US" b="1" i="1" dirty="0"/>
+              <a:t>What is it resilient against?</a:t>
+            </a:r>
+          </a:p>
+        </p:txBody>
+      </p:sp>
+      <p:sp>
+        <p:nvSpPr>
+          <p:cNvPr id="8" name="TextBox 7">
+            <a:extLst>
+              <a:ext uri="{FF2B5EF4-FFF2-40B4-BE49-F238E27FC236}">
+                <a16:creationId xmlns:a16="http://schemas.microsoft.com/office/drawing/2014/main" id="{BB738531-B192-4D54-9C8B-5A7168E5EB1C}"/>
               </a:ext>
             </a:extLst>
           </p:cNvPr>
@@ -3944,80 +3944,8 @@
         </p:nvSpPr>
         <p:spPr>
           <a:xfrm>
-            <a:off x="5961270" y="161409"/>
-            <a:ext cx="1545070" cy="646331"/>
-          </a:xfrm>
-          <a:prstGeom prst="rect">
-            <a:avLst/>
-          </a:prstGeom>
-          <a:noFill/>
-        </p:spPr>
-        <p:txBody>
-          <a:bodyPr wrap="square" rtlCol="0">
-            <a:spAutoFit/>
-          </a:bodyPr>
-          <a:lstStyle/>
-          <a:p>
-            <a:pPr algn="ctr"/>
-            <a:r>
-              <a:rPr lang="en-US" i="1" dirty="0"/>
-              <a:t>What is auditable?</a:t>
-            </a:r>
-          </a:p>
-        </p:txBody>
-      </p:sp>
-      <p:sp>
-        <p:nvSpPr>
-          <p:cNvPr id="5" name="TextBox 4">
-            <a:extLst>
-              <a:ext uri="{FF2B5EF4-FFF2-40B4-BE49-F238E27FC236}">
-                <a16:creationId xmlns:a16="http://schemas.microsoft.com/office/drawing/2014/main" id="{0B0B4B4F-2CD4-481C-A198-6EDCDC3FFC15}"/>
-              </a:ext>
-            </a:extLst>
-          </p:cNvPr>
-          <p:cNvSpPr txBox="1"/>
-          <p:nvPr/>
-        </p:nvSpPr>
-        <p:spPr>
-          <a:xfrm>
-            <a:off x="8722284" y="161409"/>
-            <a:ext cx="1844412" cy="646331"/>
-          </a:xfrm>
-          <a:prstGeom prst="rect">
-            <a:avLst/>
-          </a:prstGeom>
-          <a:noFill/>
-        </p:spPr>
-        <p:txBody>
-          <a:bodyPr wrap="square" rtlCol="0">
-            <a:spAutoFit/>
-          </a:bodyPr>
-          <a:lstStyle/>
-          <a:p>
-            <a:pPr algn="ctr"/>
-            <a:r>
-              <a:rPr lang="en-US" b="1" i="1" dirty="0"/>
-              <a:t>What is it resilient against?</a:t>
-            </a:r>
-          </a:p>
-        </p:txBody>
-      </p:sp>
-      <p:sp>
-        <p:nvSpPr>
-          <p:cNvPr id="8" name="TextBox 7">
-            <a:extLst>
-              <a:ext uri="{FF2B5EF4-FFF2-40B4-BE49-F238E27FC236}">
-                <a16:creationId xmlns:a16="http://schemas.microsoft.com/office/drawing/2014/main" id="{BB738531-B192-4D54-9C8B-5A7168E5EB1C}"/>
-              </a:ext>
-            </a:extLst>
-          </p:cNvPr>
-          <p:cNvSpPr txBox="1"/>
-          <p:nvPr/>
-        </p:nvSpPr>
-        <p:spPr>
-          <a:xfrm>
-            <a:off x="1702118" y="3161982"/>
-            <a:ext cx="1562094" cy="369332"/>
+            <a:off x="1702118" y="1065098"/>
+            <a:ext cx="1463040" cy="369332"/>
           </a:xfrm>
           <a:prstGeom prst="rect">
             <a:avLst/>
@@ -4038,7 +3966,7 @@
           </a:fontRef>
         </p:style>
         <p:txBody>
-          <a:bodyPr wrap="square" lIns="0" rIns="0" rtlCol="0">
+          <a:bodyPr wrap="square" lIns="0" rIns="0" rtlCol="0" anchor="ctr">
             <a:spAutoFit/>
           </a:bodyPr>
           <a:lstStyle/>
@@ -4069,8 +3997,8 @@
         </p:nvSpPr>
         <p:spPr>
           <a:xfrm>
-            <a:off x="1702118" y="4553705"/>
-            <a:ext cx="1562094" cy="646331"/>
+            <a:off x="1702118" y="4797474"/>
+            <a:ext cx="1463040" cy="646331"/>
           </a:xfrm>
           <a:prstGeom prst="rect">
             <a:avLst/>
@@ -4091,7 +4019,7 @@
           </a:fontRef>
         </p:style>
         <p:txBody>
-          <a:bodyPr wrap="square" lIns="0" rIns="0" rtlCol="0">
+          <a:bodyPr wrap="square" lIns="0" rIns="0" rtlCol="0" anchor="ctr">
             <a:spAutoFit/>
           </a:bodyPr>
           <a:lstStyle/>
@@ -4137,8 +4065,8 @@
         </p:nvSpPr>
         <p:spPr>
           <a:xfrm>
-            <a:off x="4414536" y="2064843"/>
-            <a:ext cx="1562094" cy="369332"/>
+            <a:off x="4616366" y="1078627"/>
+            <a:ext cx="1463040" cy="369332"/>
           </a:xfrm>
           <a:prstGeom prst="rect">
             <a:avLst/>
@@ -4159,7 +4087,7 @@
           </a:fontRef>
         </p:style>
         <p:txBody>
-          <a:bodyPr wrap="square" lIns="0" rIns="0" rtlCol="0">
+          <a:bodyPr wrap="square" lIns="0" rIns="0" rtlCol="0" anchor="ctr">
             <a:spAutoFit/>
           </a:bodyPr>
           <a:lstStyle/>
@@ -4190,8 +4118,8 @@
         </p:nvSpPr>
         <p:spPr>
           <a:xfrm>
-            <a:off x="10426377" y="1076764"/>
-            <a:ext cx="1562094" cy="646331"/>
+            <a:off x="10444861" y="940127"/>
+            <a:ext cx="1463040" cy="646331"/>
           </a:xfrm>
           <a:prstGeom prst="rect">
             <a:avLst/>
@@ -4212,7 +4140,7 @@
           </a:fontRef>
         </p:style>
         <p:txBody>
-          <a:bodyPr wrap="square" lIns="0" rIns="0" rtlCol="0">
+          <a:bodyPr wrap="square" lIns="0" rIns="0" rtlCol="0" anchor="ctr">
             <a:spAutoFit/>
           </a:bodyPr>
           <a:lstStyle/>
@@ -4261,9 +4189,9 @@
           <p:nvPr/>
         </p:nvCxnSpPr>
         <p:spPr>
-          <a:xfrm flipV="1">
-            <a:off x="3264212" y="2249509"/>
-            <a:ext cx="1150324" cy="1097139"/>
+          <a:xfrm>
+            <a:off x="3165158" y="1249764"/>
+            <a:ext cx="1451208" cy="13529"/>
           </a:xfrm>
           <a:prstGeom prst="straightConnector1">
             <a:avLst/>
@@ -4303,9 +4231,9 @@
           <p:nvPr/>
         </p:nvSpPr>
         <p:spPr>
-          <a:xfrm rot="18995167">
-            <a:off x="2983672" y="2493103"/>
-            <a:ext cx="1562094" cy="307777"/>
+          <a:xfrm>
+            <a:off x="3319262" y="958052"/>
+            <a:ext cx="1143000" cy="307777"/>
           </a:xfrm>
           <a:prstGeom prst="rect">
             <a:avLst/>
@@ -4340,8 +4268,8 @@
         </p:nvSpPr>
         <p:spPr>
           <a:xfrm>
-            <a:off x="7238657" y="3278091"/>
-            <a:ext cx="1562094" cy="646331"/>
+            <a:off x="7535155" y="3514236"/>
+            <a:ext cx="1463040" cy="646331"/>
           </a:xfrm>
           <a:prstGeom prst="rect">
             <a:avLst/>
@@ -4362,7 +4290,7 @@
           </a:fontRef>
         </p:style>
         <p:txBody>
-          <a:bodyPr wrap="square" lIns="0" rIns="0" rtlCol="0">
+          <a:bodyPr wrap="square" lIns="0" rIns="0" rtlCol="0" anchor="ctr">
             <a:spAutoFit/>
           </a:bodyPr>
           <a:lstStyle/>
@@ -4401,14 +4329,15 @@
           </p:cNvPr>
           <p:cNvCxnSpPr>
             <a:cxnSpLocks/>
-            <a:stCxn id="8" idx="3"/>
+            <a:stCxn id="8" idx="2"/>
+            <a:endCxn id="20" idx="1"/>
           </p:cNvCxnSpPr>
           <p:nvPr/>
         </p:nvCxnSpPr>
         <p:spPr>
           <a:xfrm>
-            <a:off x="3264212" y="3346648"/>
-            <a:ext cx="1931371" cy="184666"/>
+            <a:off x="2433638" y="1434430"/>
+            <a:ext cx="5101517" cy="2402972"/>
           </a:xfrm>
           <a:prstGeom prst="straightConnector1">
             <a:avLst/>
@@ -4448,9 +4377,9 @@
           <p:nvPr/>
         </p:nvSpPr>
         <p:spPr>
-          <a:xfrm rot="567756">
-            <a:off x="3134923" y="3138594"/>
-            <a:ext cx="1562094" cy="307777"/>
+          <a:xfrm rot="1500000">
+            <a:off x="3319262" y="1782578"/>
+            <a:ext cx="1143000" cy="307777"/>
           </a:xfrm>
           <a:prstGeom prst="rect">
             <a:avLst/>
@@ -4485,8 +4414,8 @@
         </p:nvSpPr>
         <p:spPr>
           <a:xfrm>
-            <a:off x="4414536" y="4089693"/>
-            <a:ext cx="1562094" cy="646331"/>
+            <a:off x="4610488" y="4797474"/>
+            <a:ext cx="1463040" cy="646331"/>
           </a:xfrm>
           <a:prstGeom prst="rect">
             <a:avLst/>
@@ -4507,7 +4436,7 @@
           </a:fontRef>
         </p:style>
         <p:txBody>
-          <a:bodyPr wrap="square" lIns="0" rIns="0" rtlCol="0">
+          <a:bodyPr wrap="square" lIns="0" rIns="0" rtlCol="0" anchor="ctr">
             <a:spAutoFit/>
           </a:bodyPr>
           <a:lstStyle/>
@@ -4519,18 +4448,22 @@
                   <a:schemeClr val="tx1"/>
                 </a:solidFill>
               </a:rPr>
-              <a:t>Database</a:t>
-            </a:r>
-          </a:p>
-          <a:p>
-            <a:pPr algn="ctr"/>
-            <a:r>
+              <a:t>Database with</a:t>
+            </a:r>
+            <a:br>
               <a:rPr lang="en-US" dirty="0">
                 <a:solidFill>
                   <a:schemeClr val="tx1"/>
                 </a:solidFill>
               </a:rPr>
-              <a:t>with consensus</a:t>
+            </a:br>
+            <a:r>
+              <a:rPr lang="en-US" dirty="0">
+                <a:solidFill>
+                  <a:schemeClr val="tx1"/>
+                </a:solidFill>
+              </a:rPr>
+              <a:t>consensus</a:t>
             </a:r>
           </a:p>
         </p:txBody>
@@ -4552,9 +4485,9 @@
           <p:nvPr/>
         </p:nvCxnSpPr>
         <p:spPr>
-          <a:xfrm flipV="1">
-            <a:off x="3264212" y="4412859"/>
-            <a:ext cx="1150324" cy="464012"/>
+          <a:xfrm>
+            <a:off x="3165158" y="5120640"/>
+            <a:ext cx="1445330" cy="0"/>
           </a:xfrm>
           <a:prstGeom prst="straightConnector1">
             <a:avLst/>
@@ -4592,15 +4525,15 @@
           </p:cNvPr>
           <p:cNvCxnSpPr>
             <a:cxnSpLocks/>
-            <a:stCxn id="9" idx="3"/>
+            <a:stCxn id="9" idx="2"/>
             <a:endCxn id="83" idx="1"/>
           </p:cNvCxnSpPr>
           <p:nvPr/>
         </p:nvCxnSpPr>
         <p:spPr>
           <a:xfrm>
-            <a:off x="3264212" y="4876871"/>
-            <a:ext cx="3974445" cy="1364206"/>
+            <a:off x="2433638" y="5443805"/>
+            <a:ext cx="5101517" cy="967887"/>
           </a:xfrm>
           <a:prstGeom prst="straightConnector1">
             <a:avLst/>
@@ -4640,9 +4573,9 @@
           <p:nvPr/>
         </p:nvSpPr>
         <p:spPr>
-          <a:xfrm rot="315789">
-            <a:off x="5674467" y="3387791"/>
-            <a:ext cx="1562094" cy="307777"/>
+          <a:xfrm rot="1500000">
+            <a:off x="6233510" y="3156756"/>
+            <a:ext cx="1143000" cy="307777"/>
           </a:xfrm>
           <a:prstGeom prst="rect">
             <a:avLst/>
@@ -4681,8 +4614,8 @@
         </p:nvCxnSpPr>
         <p:spPr>
           <a:xfrm>
-            <a:off x="8797241" y="1399929"/>
-            <a:ext cx="1629136" cy="1"/>
+            <a:off x="8993654" y="1263293"/>
+            <a:ext cx="1451207" cy="0"/>
           </a:xfrm>
           <a:prstGeom prst="straightConnector1">
             <a:avLst/>
@@ -4723,8 +4656,8 @@
         </p:nvSpPr>
         <p:spPr>
           <a:xfrm>
-            <a:off x="8796320" y="910251"/>
-            <a:ext cx="1788454" cy="523220"/>
+            <a:off x="9033458" y="950337"/>
+            <a:ext cx="1371600" cy="307777"/>
           </a:xfrm>
           <a:prstGeom prst="rect">
             <a:avLst/>
@@ -4737,17 +4670,13 @@
           </a:bodyPr>
           <a:lstStyle/>
           <a:p>
-            <a:pPr marL="137160"/>
+            <a:pPr marL="137160" indent="-137160">
+              <a:buFont typeface="Arial" panose="020B0604020202020204" pitchFamily="34" charset="0"/>
+              <a:buChar char="•"/>
+            </a:pPr>
             <a:r>
               <a:rPr lang="en-US" sz="1400" b="1" i="1" dirty="0"/>
-              <a:t>Accidental data </a:t>
-            </a:r>
-            <a:br>
-              <a:rPr lang="en-US" sz="1400" b="1" i="1" dirty="0"/>
-            </a:br>
-            <a:r>
-              <a:rPr lang="en-US" sz="1400" b="1" i="1" dirty="0"/>
-              <a:t>loss</a:t>
+              <a:t>Data loss</a:t>
             </a:r>
           </a:p>
         </p:txBody>
@@ -4766,8 +4695,8 @@
         </p:nvSpPr>
         <p:spPr>
           <a:xfrm>
-            <a:off x="7232020" y="2131444"/>
-            <a:ext cx="1568730" cy="646331"/>
+            <a:off x="7535155" y="2227090"/>
+            <a:ext cx="1463040" cy="646331"/>
           </a:xfrm>
           <a:prstGeom prst="rect">
             <a:avLst/>
@@ -4788,7 +4717,7 @@
           </a:fontRef>
         </p:style>
         <p:txBody>
-          <a:bodyPr wrap="square" lIns="0" rIns="0" rtlCol="0">
+          <a:bodyPr wrap="square" lIns="0" rIns="0" rtlCol="0" anchor="ctr">
             <a:spAutoFit/>
           </a:bodyPr>
           <a:lstStyle/>
@@ -4838,8 +4767,8 @@
         </p:nvCxnSpPr>
         <p:spPr>
           <a:xfrm>
-            <a:off x="5976630" y="2249509"/>
-            <a:ext cx="1255390" cy="205101"/>
+            <a:off x="6079406" y="1263293"/>
+            <a:ext cx="1455749" cy="1286963"/>
           </a:xfrm>
           <a:prstGeom prst="straightConnector1">
             <a:avLst/>
@@ -4879,9 +4808,9 @@
           <p:nvPr/>
         </p:nvSpPr>
         <p:spPr>
-          <a:xfrm rot="561234">
-            <a:off x="5890568" y="2097408"/>
-            <a:ext cx="1562094" cy="307777"/>
+          <a:xfrm rot="2460000">
+            <a:off x="6233510" y="1533338"/>
+            <a:ext cx="1143000" cy="307777"/>
           </a:xfrm>
           <a:prstGeom prst="rect">
             <a:avLst/>
@@ -4916,8 +4845,8 @@
         </p:nvSpPr>
         <p:spPr>
           <a:xfrm>
-            <a:off x="10438623" y="1992944"/>
-            <a:ext cx="1562094" cy="923330"/>
+            <a:off x="10438623" y="2093238"/>
+            <a:ext cx="1463040" cy="914400"/>
           </a:xfrm>
           <a:prstGeom prst="rect">
             <a:avLst/>
@@ -4938,7 +4867,7 @@
           </a:fontRef>
         </p:style>
         <p:txBody>
-          <a:bodyPr wrap="square" lIns="0" rIns="0" rtlCol="0">
+          <a:bodyPr wrap="square" lIns="0" rIns="0" rtlCol="0" anchor="ctr">
             <a:spAutoFit/>
           </a:bodyPr>
           <a:lstStyle/>
@@ -4999,8 +4928,8 @@
         </p:nvSpPr>
         <p:spPr>
           <a:xfrm>
-            <a:off x="7232019" y="4534458"/>
-            <a:ext cx="1568731" cy="646331"/>
+            <a:off x="7535155" y="4801382"/>
+            <a:ext cx="1463040" cy="646331"/>
           </a:xfrm>
           <a:prstGeom prst="rect">
             <a:avLst/>
@@ -5021,7 +4950,7 @@
           </a:fontRef>
         </p:style>
         <p:txBody>
-          <a:bodyPr wrap="square" lIns="0" rIns="0" rtlCol="0">
+          <a:bodyPr wrap="square" lIns="0" rIns="0" rtlCol="0" anchor="ctr">
             <a:spAutoFit/>
           </a:bodyPr>
           <a:lstStyle/>
@@ -5053,25 +4982,221 @@
           </a:p>
         </p:txBody>
       </p:sp>
+      <p:sp>
+        <p:nvSpPr>
+          <p:cNvPr id="53" name="TextBox 52">
+            <a:extLst>
+              <a:ext uri="{FF2B5EF4-FFF2-40B4-BE49-F238E27FC236}">
+                <a16:creationId xmlns:a16="http://schemas.microsoft.com/office/drawing/2014/main" id="{B93C88CE-D8B0-4A90-BF05-88E76E9D68A6}"/>
+              </a:ext>
+            </a:extLst>
+          </p:cNvPr>
+          <p:cNvSpPr txBox="1"/>
+          <p:nvPr/>
+        </p:nvSpPr>
+        <p:spPr>
+          <a:xfrm>
+            <a:off x="10426149" y="3380383"/>
+            <a:ext cx="1463040" cy="914400"/>
+          </a:xfrm>
+          <a:prstGeom prst="rect">
+            <a:avLst/>
+          </a:prstGeom>
+        </p:spPr>
+        <p:style>
+          <a:lnRef idx="2">
+            <a:schemeClr val="dk1"/>
+          </a:lnRef>
+          <a:fillRef idx="1">
+            <a:schemeClr val="lt1"/>
+          </a:fillRef>
+          <a:effectRef idx="0">
+            <a:schemeClr val="dk1"/>
+          </a:effectRef>
+          <a:fontRef idx="minor">
+            <a:schemeClr val="dk1"/>
+          </a:fontRef>
+        </p:style>
+        <p:txBody>
+          <a:bodyPr wrap="square" lIns="0" rIns="0" rtlCol="0" anchor="ctr">
+            <a:spAutoFit/>
+          </a:bodyPr>
+          <a:lstStyle/>
+          <a:p>
+            <a:pPr algn="ctr"/>
+            <a:r>
+              <a:rPr lang="en-US" dirty="0">
+                <a:solidFill>
+                  <a:schemeClr val="tx1"/>
+                </a:solidFill>
+              </a:rPr>
+              <a:t>Replicated</a:t>
+            </a:r>
+            <a:br>
+              <a:rPr lang="en-US" dirty="0">
+                <a:solidFill>
+                  <a:schemeClr val="tx1"/>
+                </a:solidFill>
+              </a:rPr>
+            </a:br>
+            <a:r>
+              <a:rPr lang="en-US" dirty="0">
+                <a:solidFill>
+                  <a:schemeClr val="tx1"/>
+                </a:solidFill>
+              </a:rPr>
+              <a:t>monitored</a:t>
+            </a:r>
+            <a:br>
+              <a:rPr lang="en-US" dirty="0">
+                <a:solidFill>
+                  <a:schemeClr val="tx1"/>
+                </a:solidFill>
+              </a:rPr>
+            </a:br>
+            <a:r>
+              <a:rPr lang="en-US" dirty="0">
+                <a:solidFill>
+                  <a:schemeClr val="tx1"/>
+                </a:solidFill>
+              </a:rPr>
+              <a:t>ledger</a:t>
+            </a:r>
+          </a:p>
+        </p:txBody>
+      </p:sp>
+      <p:sp>
+        <p:nvSpPr>
+          <p:cNvPr id="54" name="TextBox 53">
+            <a:extLst>
+              <a:ext uri="{FF2B5EF4-FFF2-40B4-BE49-F238E27FC236}">
+                <a16:creationId xmlns:a16="http://schemas.microsoft.com/office/drawing/2014/main" id="{5D2B009E-70F6-48C2-8843-91388C274749}"/>
+              </a:ext>
+            </a:extLst>
+          </p:cNvPr>
+          <p:cNvSpPr txBox="1"/>
+          <p:nvPr/>
+        </p:nvSpPr>
+        <p:spPr>
+          <a:xfrm>
+            <a:off x="10444860" y="4663440"/>
+            <a:ext cx="1463040" cy="914400"/>
+          </a:xfrm>
+          <a:prstGeom prst="rect">
+            <a:avLst/>
+          </a:prstGeom>
+        </p:spPr>
+        <p:style>
+          <a:lnRef idx="2">
+            <a:schemeClr val="dk1"/>
+          </a:lnRef>
+          <a:fillRef idx="1">
+            <a:schemeClr val="lt1"/>
+          </a:fillRef>
+          <a:effectRef idx="0">
+            <a:schemeClr val="dk1"/>
+          </a:effectRef>
+          <a:fontRef idx="minor">
+            <a:schemeClr val="dk1"/>
+          </a:fontRef>
+        </p:style>
+        <p:txBody>
+          <a:bodyPr wrap="square" lIns="0" rIns="0" rtlCol="0" anchor="ctr">
+            <a:spAutoFit/>
+          </a:bodyPr>
+          <a:lstStyle/>
+          <a:p>
+            <a:pPr algn="ctr"/>
+            <a:r>
+              <a:rPr lang="en-US" dirty="0">
+                <a:solidFill>
+                  <a:schemeClr val="tx1"/>
+                </a:solidFill>
+              </a:rPr>
+              <a:t>Replicated database with consensus</a:t>
+            </a:r>
+          </a:p>
+        </p:txBody>
+      </p:sp>
+      <p:sp>
+        <p:nvSpPr>
+          <p:cNvPr id="57" name="TextBox 56">
+            <a:extLst>
+              <a:ext uri="{FF2B5EF4-FFF2-40B4-BE49-F238E27FC236}">
+                <a16:creationId xmlns:a16="http://schemas.microsoft.com/office/drawing/2014/main" id="{1C30361C-6CD6-43AD-84B0-B6F0CA305806}"/>
+              </a:ext>
+            </a:extLst>
+          </p:cNvPr>
+          <p:cNvSpPr txBox="1"/>
+          <p:nvPr/>
+        </p:nvSpPr>
+        <p:spPr>
+          <a:xfrm>
+            <a:off x="10451097" y="6227209"/>
+            <a:ext cx="1463040" cy="369332"/>
+          </a:xfrm>
+          <a:prstGeom prst="rect">
+            <a:avLst/>
+          </a:prstGeom>
+          <a:solidFill>
+            <a:schemeClr val="accent4">
+              <a:lumMod val="20000"/>
+              <a:lumOff val="80000"/>
+            </a:schemeClr>
+          </a:solidFill>
+        </p:spPr>
+        <p:style>
+          <a:lnRef idx="2">
+            <a:schemeClr val="dk1"/>
+          </a:lnRef>
+          <a:fillRef idx="1">
+            <a:schemeClr val="lt1"/>
+          </a:fillRef>
+          <a:effectRef idx="0">
+            <a:schemeClr val="dk1"/>
+          </a:effectRef>
+          <a:fontRef idx="minor">
+            <a:schemeClr val="dk1"/>
+          </a:fontRef>
+        </p:style>
+        <p:txBody>
+          <a:bodyPr wrap="square" lIns="0" rIns="0" rtlCol="0" anchor="ctr">
+            <a:spAutoFit/>
+          </a:bodyPr>
+          <a:lstStyle/>
+          <a:p>
+            <a:pPr algn="ctr"/>
+            <a:r>
+              <a:rPr lang="en-US" dirty="0">
+                <a:solidFill>
+                  <a:schemeClr val="tx1"/>
+                </a:solidFill>
+              </a:rPr>
+              <a:t>Blockchain</a:t>
+            </a:r>
+          </a:p>
+        </p:txBody>
+      </p:sp>
       <p:cxnSp>
         <p:nvCxnSpPr>
-          <p:cNvPr id="36" name="Straight Arrow Connector 35">
-            <a:extLst>
-              <a:ext uri="{FF2B5EF4-FFF2-40B4-BE49-F238E27FC236}">
-                <a16:creationId xmlns:a16="http://schemas.microsoft.com/office/drawing/2014/main" id="{5C8870F3-DCEF-4392-9563-CEBBAA7B94E1}"/>
+          <p:cNvPr id="58" name="Straight Arrow Connector 57">
+            <a:extLst>
+              <a:ext uri="{FF2B5EF4-FFF2-40B4-BE49-F238E27FC236}">
+                <a16:creationId xmlns:a16="http://schemas.microsoft.com/office/drawing/2014/main" id="{B23EA984-B650-4FFD-8477-3594991ED19A}"/>
               </a:ext>
             </a:extLst>
           </p:cNvPr>
           <p:cNvCxnSpPr>
             <a:cxnSpLocks/>
-            <a:stCxn id="9" idx="3"/>
+            <a:stCxn id="25" idx="3"/>
+            <a:endCxn id="35" idx="1"/>
           </p:cNvCxnSpPr>
           <p:nvPr/>
         </p:nvCxnSpPr>
         <p:spPr>
           <a:xfrm>
-            <a:off x="3264212" y="4876871"/>
-            <a:ext cx="1716728" cy="591749"/>
+            <a:off x="6073528" y="5120640"/>
+            <a:ext cx="1461627" cy="3908"/>
           </a:xfrm>
           <a:prstGeom prst="straightConnector1">
             <a:avLst/>
@@ -5100,10 +5225,10 @@
       </p:cxnSp>
       <p:sp>
         <p:nvSpPr>
-          <p:cNvPr id="53" name="TextBox 52">
-            <a:extLst>
-              <a:ext uri="{FF2B5EF4-FFF2-40B4-BE49-F238E27FC236}">
-                <a16:creationId xmlns:a16="http://schemas.microsoft.com/office/drawing/2014/main" id="{B93C88CE-D8B0-4A90-BF05-88E76E9D68A6}"/>
+          <p:cNvPr id="94" name="TextBox 93">
+            <a:extLst>
+              <a:ext uri="{FF2B5EF4-FFF2-40B4-BE49-F238E27FC236}">
+                <a16:creationId xmlns:a16="http://schemas.microsoft.com/office/drawing/2014/main" id="{6A542EA7-214F-4742-9747-1843C842B772}"/>
               </a:ext>
             </a:extLst>
           </p:cNvPr>
@@ -5112,201 +5237,48 @@
         </p:nvSpPr>
         <p:spPr>
           <a:xfrm>
-            <a:off x="10426149" y="3139592"/>
-            <a:ext cx="1562094" cy="923330"/>
+            <a:off x="374352" y="4820557"/>
+            <a:ext cx="1247946" cy="307777"/>
           </a:xfrm>
           <a:prstGeom prst="rect">
             <a:avLst/>
           </a:prstGeom>
-        </p:spPr>
-        <p:style>
-          <a:lnRef idx="2">
-            <a:schemeClr val="dk1"/>
-          </a:lnRef>
-          <a:fillRef idx="1">
-            <a:schemeClr val="lt1"/>
-          </a:fillRef>
-          <a:effectRef idx="0">
-            <a:schemeClr val="dk1"/>
-          </a:effectRef>
-          <a:fontRef idx="minor">
-            <a:schemeClr val="dk1"/>
-          </a:fontRef>
-        </p:style>
-        <p:txBody>
-          <a:bodyPr wrap="square" lIns="0" rIns="0" rtlCol="0">
+          <a:noFill/>
+        </p:spPr>
+        <p:txBody>
+          <a:bodyPr wrap="square" rtlCol="0">
             <a:spAutoFit/>
           </a:bodyPr>
           <a:lstStyle/>
           <a:p>
             <a:pPr algn="ctr"/>
             <a:r>
-              <a:rPr lang="en-US" dirty="0">
-                <a:solidFill>
-                  <a:schemeClr val="tx1"/>
-                </a:solidFill>
-              </a:rPr>
-              <a:t>Replicated</a:t>
-            </a:r>
-            <a:br>
-              <a:rPr lang="en-US" dirty="0">
-                <a:solidFill>
-                  <a:schemeClr val="tx1"/>
-                </a:solidFill>
-              </a:rPr>
-            </a:br>
-            <a:r>
-              <a:rPr lang="en-US" dirty="0">
-                <a:solidFill>
-                  <a:schemeClr val="tx1"/>
-                </a:solidFill>
-              </a:rPr>
-              <a:t>monitored</a:t>
-            </a:r>
-            <a:br>
-              <a:rPr lang="en-US" dirty="0">
-                <a:solidFill>
-                  <a:schemeClr val="tx1"/>
-                </a:solidFill>
-              </a:rPr>
-            </a:br>
-            <a:r>
-              <a:rPr lang="en-US" dirty="0">
-                <a:solidFill>
-                  <a:schemeClr val="tx1"/>
-                </a:solidFill>
-              </a:rPr>
-              <a:t>ledger</a:t>
-            </a:r>
-          </a:p>
-        </p:txBody>
-      </p:sp>
-      <p:sp>
-        <p:nvSpPr>
-          <p:cNvPr id="54" name="TextBox 53">
-            <a:extLst>
-              <a:ext uri="{FF2B5EF4-FFF2-40B4-BE49-F238E27FC236}">
-                <a16:creationId xmlns:a16="http://schemas.microsoft.com/office/drawing/2014/main" id="{5D2B009E-70F6-48C2-8843-91388C274749}"/>
-              </a:ext>
-            </a:extLst>
-          </p:cNvPr>
-          <p:cNvSpPr txBox="1"/>
-          <p:nvPr/>
-        </p:nvSpPr>
-        <p:spPr>
-          <a:xfrm>
-            <a:off x="10438623" y="4519942"/>
-            <a:ext cx="1549619" cy="923330"/>
-          </a:xfrm>
-          <a:prstGeom prst="rect">
-            <a:avLst/>
-          </a:prstGeom>
-        </p:spPr>
-        <p:style>
-          <a:lnRef idx="2">
-            <a:schemeClr val="dk1"/>
-          </a:lnRef>
-          <a:fillRef idx="1">
-            <a:schemeClr val="lt1"/>
-          </a:fillRef>
-          <a:effectRef idx="0">
-            <a:schemeClr val="dk1"/>
-          </a:effectRef>
-          <a:fontRef idx="minor">
-            <a:schemeClr val="dk1"/>
-          </a:fontRef>
-        </p:style>
-        <p:txBody>
-          <a:bodyPr wrap="square" lIns="0" rIns="0" rtlCol="0">
-            <a:spAutoFit/>
-          </a:bodyPr>
-          <a:lstStyle/>
-          <a:p>
-            <a:pPr algn="ctr"/>
-            <a:r>
-              <a:rPr lang="en-US" dirty="0">
-                <a:solidFill>
-                  <a:schemeClr val="tx1"/>
-                </a:solidFill>
-              </a:rPr>
-              <a:t>Replicated database with consensus</a:t>
-            </a:r>
-          </a:p>
-        </p:txBody>
-      </p:sp>
-      <p:sp>
-        <p:nvSpPr>
-          <p:cNvPr id="57" name="TextBox 56">
-            <a:extLst>
-              <a:ext uri="{FF2B5EF4-FFF2-40B4-BE49-F238E27FC236}">
-                <a16:creationId xmlns:a16="http://schemas.microsoft.com/office/drawing/2014/main" id="{1C30361C-6CD6-43AD-84B0-B6F0CA305806}"/>
-              </a:ext>
-            </a:extLst>
-          </p:cNvPr>
-          <p:cNvSpPr txBox="1"/>
-          <p:nvPr/>
-        </p:nvSpPr>
-        <p:spPr>
-          <a:xfrm>
-            <a:off x="10438623" y="6049991"/>
-            <a:ext cx="1549620" cy="369332"/>
-          </a:xfrm>
-          <a:prstGeom prst="rect">
-            <a:avLst/>
-          </a:prstGeom>
-        </p:spPr>
-        <p:style>
-          <a:lnRef idx="2">
-            <a:schemeClr val="dk1"/>
-          </a:lnRef>
-          <a:fillRef idx="1">
-            <a:schemeClr val="lt1"/>
-          </a:fillRef>
-          <a:effectRef idx="0">
-            <a:schemeClr val="dk1"/>
-          </a:effectRef>
-          <a:fontRef idx="minor">
-            <a:schemeClr val="dk1"/>
-          </a:fontRef>
-        </p:style>
-        <p:txBody>
-          <a:bodyPr wrap="square" lIns="0" rIns="0" rtlCol="0">
-            <a:spAutoFit/>
-          </a:bodyPr>
-          <a:lstStyle/>
-          <a:p>
-            <a:pPr algn="ctr"/>
-            <a:r>
-              <a:rPr lang="en-US" dirty="0">
-                <a:solidFill>
-                  <a:schemeClr val="tx1"/>
-                </a:solidFill>
-              </a:rPr>
-              <a:t>Blockchain</a:t>
+              <a:rPr lang="en-US" sz="1400" dirty="0"/>
+              <a:t>Decentralized</a:t>
             </a:r>
           </a:p>
         </p:txBody>
       </p:sp>
       <p:cxnSp>
         <p:nvCxnSpPr>
-          <p:cNvPr id="58" name="Straight Arrow Connector 57">
-            <a:extLst>
-              <a:ext uri="{FF2B5EF4-FFF2-40B4-BE49-F238E27FC236}">
-                <a16:creationId xmlns:a16="http://schemas.microsoft.com/office/drawing/2014/main" id="{B23EA984-B650-4FFD-8477-3594991ED19A}"/>
+          <p:cNvPr id="47" name="Straight Arrow Connector 33">
+            <a:extLst>
+              <a:ext uri="{FF2B5EF4-FFF2-40B4-BE49-F238E27FC236}">
+                <a16:creationId xmlns:a16="http://schemas.microsoft.com/office/drawing/2014/main" id="{D30ED66A-DA43-4E32-B988-7A6B21558C2B}"/>
               </a:ext>
             </a:extLst>
           </p:cNvPr>
           <p:cNvCxnSpPr>
             <a:cxnSpLocks/>
-            <a:stCxn id="25" idx="3"/>
-            <a:endCxn id="35" idx="1"/>
+            <a:stCxn id="50" idx="3"/>
+            <a:endCxn id="61" idx="1"/>
           </p:cNvCxnSpPr>
           <p:nvPr/>
         </p:nvCxnSpPr>
         <p:spPr>
           <a:xfrm>
-            <a:off x="5976630" y="4412859"/>
-            <a:ext cx="1255389" cy="444765"/>
+            <a:off x="8998195" y="2550256"/>
+            <a:ext cx="1440428" cy="182"/>
           </a:xfrm>
           <a:prstGeom prst="straightConnector1">
             <a:avLst/>
@@ -5335,10 +5307,10 @@
       </p:cxnSp>
       <p:sp>
         <p:nvSpPr>
-          <p:cNvPr id="59" name="TextBox 58">
-            <a:extLst>
-              <a:ext uri="{FF2B5EF4-FFF2-40B4-BE49-F238E27FC236}">
-                <a16:creationId xmlns:a16="http://schemas.microsoft.com/office/drawing/2014/main" id="{88CFA8E9-0CBA-4ECC-81E5-790565A8D340}"/>
+          <p:cNvPr id="48" name="TextBox 47">
+            <a:extLst>
+              <a:ext uri="{FF2B5EF4-FFF2-40B4-BE49-F238E27FC236}">
+                <a16:creationId xmlns:a16="http://schemas.microsoft.com/office/drawing/2014/main" id="{2B3AF30E-31A6-4363-B822-B1294382AECB}"/>
               </a:ext>
             </a:extLst>
           </p:cNvPr>
@@ -5346,9 +5318,9 @@
           <p:nvPr/>
         </p:nvSpPr>
         <p:spPr>
-          <a:xfrm rot="1185460">
-            <a:off x="5870499" y="4369444"/>
-            <a:ext cx="1562094" cy="307777"/>
+          <a:xfrm>
+            <a:off x="9033458" y="1816677"/>
+            <a:ext cx="1371600" cy="738664"/>
           </a:xfrm>
           <a:prstGeom prst="rect">
             <a:avLst/>
@@ -5361,210 +5333,13 @@
           </a:bodyPr>
           <a:lstStyle/>
           <a:p>
-            <a:pPr algn="ctr"/>
-            <a:r>
-              <a:rPr lang="en-US" sz="1400" i="1" dirty="0"/>
-              <a:t>Current state</a:t>
-            </a:r>
-          </a:p>
-        </p:txBody>
-      </p:sp>
-      <p:sp>
-        <p:nvSpPr>
-          <p:cNvPr id="62" name="TextBox 61">
-            <a:extLst>
-              <a:ext uri="{FF2B5EF4-FFF2-40B4-BE49-F238E27FC236}">
-                <a16:creationId xmlns:a16="http://schemas.microsoft.com/office/drawing/2014/main" id="{FFBB5E4C-CE6A-4831-8462-1BE32AC03519}"/>
-              </a:ext>
-            </a:extLst>
-          </p:cNvPr>
-          <p:cNvSpPr txBox="1"/>
-          <p:nvPr/>
-        </p:nvSpPr>
-        <p:spPr>
-          <a:xfrm rot="3272274">
-            <a:off x="5964031" y="5128657"/>
-            <a:ext cx="1562094" cy="307777"/>
-          </a:xfrm>
-          <a:prstGeom prst="rect">
-            <a:avLst/>
-          </a:prstGeom>
-          <a:noFill/>
-        </p:spPr>
-        <p:txBody>
-          <a:bodyPr wrap="square" rtlCol="0">
-            <a:spAutoFit/>
-          </a:bodyPr>
-          <a:lstStyle/>
-          <a:p>
-            <a:pPr algn="ctr"/>
-            <a:r>
-              <a:rPr lang="en-US" sz="1400" i="1" dirty="0"/>
-              <a:t>Provenance</a:t>
-            </a:r>
-          </a:p>
-        </p:txBody>
-      </p:sp>
-      <p:sp>
-        <p:nvSpPr>
-          <p:cNvPr id="93" name="TextBox 92">
-            <a:extLst>
-              <a:ext uri="{FF2B5EF4-FFF2-40B4-BE49-F238E27FC236}">
-                <a16:creationId xmlns:a16="http://schemas.microsoft.com/office/drawing/2014/main" id="{621B22A0-EB75-472B-AD6B-1044C4CDFB62}"/>
-              </a:ext>
-            </a:extLst>
-          </p:cNvPr>
-          <p:cNvSpPr txBox="1"/>
-          <p:nvPr/>
-        </p:nvSpPr>
-        <p:spPr>
-          <a:xfrm>
-            <a:off x="374883" y="3192761"/>
-            <a:ext cx="1247946" cy="307777"/>
-          </a:xfrm>
-          <a:prstGeom prst="rect">
-            <a:avLst/>
-          </a:prstGeom>
-          <a:noFill/>
-        </p:spPr>
-        <p:txBody>
-          <a:bodyPr wrap="square" rtlCol="0">
-            <a:spAutoFit/>
-          </a:bodyPr>
-          <a:lstStyle/>
-          <a:p>
-            <a:pPr algn="r"/>
-            <a:r>
-              <a:rPr lang="en-US" sz="1400" dirty="0"/>
-              <a:t>Centralized</a:t>
-            </a:r>
-          </a:p>
-        </p:txBody>
-      </p:sp>
-      <p:sp>
-        <p:nvSpPr>
-          <p:cNvPr id="94" name="TextBox 93">
-            <a:extLst>
-              <a:ext uri="{FF2B5EF4-FFF2-40B4-BE49-F238E27FC236}">
-                <a16:creationId xmlns:a16="http://schemas.microsoft.com/office/drawing/2014/main" id="{6A542EA7-214F-4742-9747-1843C842B772}"/>
-              </a:ext>
-            </a:extLst>
-          </p:cNvPr>
-          <p:cNvSpPr txBox="1"/>
-          <p:nvPr/>
-        </p:nvSpPr>
-        <p:spPr>
-          <a:xfrm>
-            <a:off x="374883" y="4722983"/>
-            <a:ext cx="1247946" cy="307777"/>
-          </a:xfrm>
-          <a:prstGeom prst="rect">
-            <a:avLst/>
-          </a:prstGeom>
-          <a:noFill/>
-        </p:spPr>
-        <p:txBody>
-          <a:bodyPr wrap="square" rtlCol="0">
-            <a:spAutoFit/>
-          </a:bodyPr>
-          <a:lstStyle/>
-          <a:p>
-            <a:pPr algn="r"/>
-            <a:r>
-              <a:rPr lang="en-US" sz="1400" dirty="0"/>
-              <a:t>Decentralized</a:t>
-            </a:r>
-          </a:p>
-        </p:txBody>
-      </p:sp>
-      <p:cxnSp>
-        <p:nvCxnSpPr>
-          <p:cNvPr id="47" name="Straight Arrow Connector 33">
-            <a:extLst>
-              <a:ext uri="{FF2B5EF4-FFF2-40B4-BE49-F238E27FC236}">
-                <a16:creationId xmlns:a16="http://schemas.microsoft.com/office/drawing/2014/main" id="{D30ED66A-DA43-4E32-B988-7A6B21558C2B}"/>
-              </a:ext>
-            </a:extLst>
-          </p:cNvPr>
-          <p:cNvCxnSpPr>
-            <a:cxnSpLocks/>
-            <a:stCxn id="50" idx="3"/>
-            <a:endCxn id="61" idx="1"/>
-          </p:cNvCxnSpPr>
-          <p:nvPr/>
-        </p:nvCxnSpPr>
-        <p:spPr>
-          <a:xfrm flipV="1">
-            <a:off x="8800750" y="2454609"/>
-            <a:ext cx="1637873" cy="1"/>
-          </a:xfrm>
-          <a:prstGeom prst="straightConnector1">
-            <a:avLst/>
-          </a:prstGeom>
-          <a:ln>
-            <a:solidFill>
-              <a:schemeClr val="tx1"/>
-            </a:solidFill>
-            <a:tailEnd type="triangle"/>
-          </a:ln>
-        </p:spPr>
-        <p:style>
-          <a:lnRef idx="1">
-            <a:schemeClr val="accent1"/>
-          </a:lnRef>
-          <a:fillRef idx="0">
-            <a:schemeClr val="accent1"/>
-          </a:fillRef>
-          <a:effectRef idx="0">
-            <a:schemeClr val="accent1"/>
-          </a:effectRef>
-          <a:fontRef idx="minor">
-            <a:schemeClr val="tx1"/>
-          </a:fontRef>
-        </p:style>
-      </p:cxnSp>
-      <p:sp>
-        <p:nvSpPr>
-          <p:cNvPr id="48" name="TextBox 47">
-            <a:extLst>
-              <a:ext uri="{FF2B5EF4-FFF2-40B4-BE49-F238E27FC236}">
-                <a16:creationId xmlns:a16="http://schemas.microsoft.com/office/drawing/2014/main" id="{2B3AF30E-31A6-4363-B822-B1294382AECB}"/>
-              </a:ext>
-            </a:extLst>
-          </p:cNvPr>
-          <p:cNvSpPr txBox="1"/>
-          <p:nvPr/>
-        </p:nvSpPr>
-        <p:spPr>
-          <a:xfrm>
-            <a:off x="8796320" y="1566690"/>
-            <a:ext cx="2112335" cy="954107"/>
-          </a:xfrm>
-          <a:prstGeom prst="rect">
-            <a:avLst/>
-          </a:prstGeom>
-          <a:noFill/>
-        </p:spPr>
-        <p:txBody>
-          <a:bodyPr wrap="square" rtlCol="0">
-            <a:spAutoFit/>
-          </a:bodyPr>
-          <a:lstStyle/>
-          <a:p>
             <a:pPr marL="137160" indent="-137160">
               <a:buFont typeface="Arial" panose="020B0604020202020204" pitchFamily="34" charset="0"/>
               <a:buChar char="•"/>
             </a:pPr>
             <a:r>
               <a:rPr lang="en-US" sz="1400" b="1" i="1" dirty="0"/>
-              <a:t>Accidental data</a:t>
-            </a:r>
-            <a:br>
-              <a:rPr lang="en-US" sz="1400" b="1" i="1" dirty="0"/>
-            </a:br>
-            <a:r>
-              <a:rPr lang="en-US" sz="1400" b="1" i="1" dirty="0"/>
-              <a:t>loss</a:t>
+              <a:t>Data loss</a:t>
             </a:r>
           </a:p>
           <a:p>
@@ -5597,13 +5372,15 @@
           </p:cNvPr>
           <p:cNvCxnSpPr>
             <a:cxnSpLocks/>
+            <a:stCxn id="20" idx="3"/>
+            <a:endCxn id="53" idx="1"/>
           </p:cNvCxnSpPr>
           <p:nvPr/>
         </p:nvCxnSpPr>
         <p:spPr>
-          <a:xfrm flipV="1">
-            <a:off x="8808720" y="3673766"/>
-            <a:ext cx="1588438" cy="0"/>
+          <a:xfrm>
+            <a:off x="8998195" y="3837402"/>
+            <a:ext cx="1427954" cy="181"/>
           </a:xfrm>
           <a:prstGeom prst="straightConnector1">
             <a:avLst/>
@@ -5641,13 +5418,330 @@
           </p:cNvPr>
           <p:cNvCxnSpPr>
             <a:cxnSpLocks/>
+            <a:endCxn id="9" idx="1"/>
           </p:cNvCxnSpPr>
           <p:nvPr/>
         </p:nvCxnSpPr>
         <p:spPr>
           <a:xfrm>
-            <a:off x="449451" y="5007902"/>
-            <a:ext cx="1252667" cy="0"/>
+            <a:off x="295594" y="5120640"/>
+            <a:ext cx="1406524" cy="0"/>
+          </a:xfrm>
+          <a:prstGeom prst="straightConnector1">
+            <a:avLst/>
+          </a:prstGeom>
+          <a:ln>
+            <a:solidFill>
+              <a:schemeClr val="tx1"/>
+            </a:solidFill>
+            <a:tailEnd type="triangle"/>
+          </a:ln>
+        </p:spPr>
+        <p:style>
+          <a:lnRef idx="1">
+            <a:schemeClr val="accent1"/>
+          </a:lnRef>
+          <a:fillRef idx="0">
+            <a:schemeClr val="accent1"/>
+          </a:fillRef>
+          <a:effectRef idx="0">
+            <a:schemeClr val="accent1"/>
+          </a:effectRef>
+          <a:fontRef idx="minor">
+            <a:schemeClr val="tx1"/>
+          </a:fontRef>
+        </p:style>
+      </p:cxnSp>
+      <p:sp>
+        <p:nvSpPr>
+          <p:cNvPr id="80" name="TextBox 79">
+            <a:extLst>
+              <a:ext uri="{FF2B5EF4-FFF2-40B4-BE49-F238E27FC236}">
+                <a16:creationId xmlns:a16="http://schemas.microsoft.com/office/drawing/2014/main" id="{DB542A89-5513-4C5A-B545-C688F2B99A95}"/>
+              </a:ext>
+            </a:extLst>
+          </p:cNvPr>
+          <p:cNvSpPr txBox="1"/>
+          <p:nvPr/>
+        </p:nvSpPr>
+        <p:spPr>
+          <a:xfrm>
+            <a:off x="7530614" y="1078627"/>
+            <a:ext cx="1463040" cy="369332"/>
+          </a:xfrm>
+          <a:prstGeom prst="rect">
+            <a:avLst/>
+          </a:prstGeom>
+        </p:spPr>
+        <p:style>
+          <a:lnRef idx="2">
+            <a:schemeClr val="dk1"/>
+          </a:lnRef>
+          <a:fillRef idx="1">
+            <a:schemeClr val="lt1"/>
+          </a:fillRef>
+          <a:effectRef idx="0">
+            <a:schemeClr val="dk1"/>
+          </a:effectRef>
+          <a:fontRef idx="minor">
+            <a:schemeClr val="dk1"/>
+          </a:fontRef>
+        </p:style>
+        <p:txBody>
+          <a:bodyPr wrap="square" lIns="0" rIns="0" rtlCol="0" anchor="ctr">
+            <a:spAutoFit/>
+          </a:bodyPr>
+          <a:lstStyle/>
+          <a:p>
+            <a:pPr algn="ctr"/>
+            <a:r>
+              <a:rPr lang="en-US" dirty="0">
+                <a:solidFill>
+                  <a:schemeClr val="tx1"/>
+                </a:solidFill>
+              </a:rPr>
+              <a:t>Database</a:t>
+            </a:r>
+          </a:p>
+        </p:txBody>
+      </p:sp>
+      <p:sp>
+        <p:nvSpPr>
+          <p:cNvPr id="83" name="TextBox 82">
+            <a:extLst>
+              <a:ext uri="{FF2B5EF4-FFF2-40B4-BE49-F238E27FC236}">
+                <a16:creationId xmlns:a16="http://schemas.microsoft.com/office/drawing/2014/main" id="{8F8C12C3-066C-45F1-A75D-4347B99FB119}"/>
+              </a:ext>
+            </a:extLst>
+          </p:cNvPr>
+          <p:cNvSpPr txBox="1"/>
+          <p:nvPr/>
+        </p:nvSpPr>
+        <p:spPr>
+          <a:xfrm>
+            <a:off x="7535155" y="6088526"/>
+            <a:ext cx="1463040" cy="646331"/>
+          </a:xfrm>
+          <a:prstGeom prst="rect">
+            <a:avLst/>
+          </a:prstGeom>
+        </p:spPr>
+        <p:style>
+          <a:lnRef idx="2">
+            <a:schemeClr val="dk1"/>
+          </a:lnRef>
+          <a:fillRef idx="1">
+            <a:schemeClr val="lt1"/>
+          </a:fillRef>
+          <a:effectRef idx="0">
+            <a:schemeClr val="dk1"/>
+          </a:effectRef>
+          <a:fontRef idx="minor">
+            <a:schemeClr val="dk1"/>
+          </a:fontRef>
+        </p:style>
+        <p:txBody>
+          <a:bodyPr wrap="square" lIns="0" rIns="0" rtlCol="0" anchor="ctr">
+            <a:spAutoFit/>
+          </a:bodyPr>
+          <a:lstStyle/>
+          <a:p>
+            <a:pPr algn="ctr"/>
+            <a:r>
+              <a:rPr lang="en-US" dirty="0">
+                <a:solidFill>
+                  <a:schemeClr val="tx1"/>
+                </a:solidFill>
+              </a:rPr>
+              <a:t>Ledger with consensus</a:t>
+            </a:r>
+          </a:p>
+        </p:txBody>
+      </p:sp>
+      <p:cxnSp>
+        <p:nvCxnSpPr>
+          <p:cNvPr id="86" name="Straight Arrow Connector 85">
+            <a:extLst>
+              <a:ext uri="{FF2B5EF4-FFF2-40B4-BE49-F238E27FC236}">
+                <a16:creationId xmlns:a16="http://schemas.microsoft.com/office/drawing/2014/main" id="{147371C3-B149-4F60-A231-3617515EB559}"/>
+              </a:ext>
+            </a:extLst>
+          </p:cNvPr>
+          <p:cNvCxnSpPr>
+            <a:cxnSpLocks/>
+            <a:stCxn id="11" idx="3"/>
+            <a:endCxn id="80" idx="1"/>
+          </p:cNvCxnSpPr>
+          <p:nvPr/>
+        </p:nvCxnSpPr>
+        <p:spPr>
+          <a:xfrm>
+            <a:off x="6079406" y="1263293"/>
+            <a:ext cx="1451208" cy="0"/>
+          </a:xfrm>
+          <a:prstGeom prst="straightConnector1">
+            <a:avLst/>
+          </a:prstGeom>
+          <a:ln>
+            <a:solidFill>
+              <a:schemeClr val="tx1"/>
+            </a:solidFill>
+            <a:tailEnd type="triangle"/>
+          </a:ln>
+        </p:spPr>
+        <p:style>
+          <a:lnRef idx="1">
+            <a:schemeClr val="accent1"/>
+          </a:lnRef>
+          <a:fillRef idx="0">
+            <a:schemeClr val="accent1"/>
+          </a:fillRef>
+          <a:effectRef idx="0">
+            <a:schemeClr val="accent1"/>
+          </a:effectRef>
+          <a:fontRef idx="minor">
+            <a:schemeClr val="tx1"/>
+          </a:fontRef>
+        </p:style>
+      </p:cxnSp>
+      <p:sp>
+        <p:nvSpPr>
+          <p:cNvPr id="88" name="TextBox 87">
+            <a:extLst>
+              <a:ext uri="{FF2B5EF4-FFF2-40B4-BE49-F238E27FC236}">
+                <a16:creationId xmlns:a16="http://schemas.microsoft.com/office/drawing/2014/main" id="{7B105741-7B48-4FD4-9184-8949FCB9E4F9}"/>
+              </a:ext>
+            </a:extLst>
+          </p:cNvPr>
+          <p:cNvSpPr txBox="1"/>
+          <p:nvPr/>
+        </p:nvSpPr>
+        <p:spPr>
+          <a:xfrm>
+            <a:off x="6233510" y="942611"/>
+            <a:ext cx="1143000" cy="307777"/>
+          </a:xfrm>
+          <a:prstGeom prst="rect">
+            <a:avLst/>
+          </a:prstGeom>
+          <a:noFill/>
+        </p:spPr>
+        <p:txBody>
+          <a:bodyPr wrap="square" rtlCol="0">
+            <a:spAutoFit/>
+          </a:bodyPr>
+          <a:lstStyle/>
+          <a:p>
+            <a:pPr algn="ctr"/>
+            <a:r>
+              <a:rPr lang="en-US" sz="1400" i="1" dirty="0"/>
+              <a:t>Nothing</a:t>
+            </a:r>
+          </a:p>
+        </p:txBody>
+      </p:sp>
+      <p:cxnSp>
+        <p:nvCxnSpPr>
+          <p:cNvPr id="89" name="Straight Arrow Connector 88">
+            <a:extLst>
+              <a:ext uri="{FF2B5EF4-FFF2-40B4-BE49-F238E27FC236}">
+                <a16:creationId xmlns:a16="http://schemas.microsoft.com/office/drawing/2014/main" id="{0D2A6C58-8683-4F1A-A6C0-155F85D73905}"/>
+              </a:ext>
+            </a:extLst>
+          </p:cNvPr>
+          <p:cNvCxnSpPr>
+            <a:cxnSpLocks/>
+            <a:stCxn id="11" idx="3"/>
+            <a:endCxn id="20" idx="1"/>
+          </p:cNvCxnSpPr>
+          <p:nvPr/>
+        </p:nvCxnSpPr>
+        <p:spPr>
+          <a:xfrm>
+            <a:off x="6079406" y="1263293"/>
+            <a:ext cx="1455749" cy="2574109"/>
+          </a:xfrm>
+          <a:prstGeom prst="straightConnector1">
+            <a:avLst/>
+          </a:prstGeom>
+          <a:ln>
+            <a:solidFill>
+              <a:schemeClr val="tx1"/>
+            </a:solidFill>
+            <a:tailEnd type="triangle"/>
+          </a:ln>
+        </p:spPr>
+        <p:style>
+          <a:lnRef idx="1">
+            <a:schemeClr val="accent1"/>
+          </a:lnRef>
+          <a:fillRef idx="0">
+            <a:schemeClr val="accent1"/>
+          </a:fillRef>
+          <a:effectRef idx="0">
+            <a:schemeClr val="accent1"/>
+          </a:effectRef>
+          <a:fontRef idx="minor">
+            <a:schemeClr val="tx1"/>
+          </a:fontRef>
+        </p:style>
+      </p:cxnSp>
+      <p:sp>
+        <p:nvSpPr>
+          <p:cNvPr id="92" name="TextBox 91">
+            <a:extLst>
+              <a:ext uri="{FF2B5EF4-FFF2-40B4-BE49-F238E27FC236}">
+                <a16:creationId xmlns:a16="http://schemas.microsoft.com/office/drawing/2014/main" id="{E254746F-8631-4461-8A48-B99924C78776}"/>
+              </a:ext>
+            </a:extLst>
+          </p:cNvPr>
+          <p:cNvSpPr txBox="1"/>
+          <p:nvPr/>
+        </p:nvSpPr>
+        <p:spPr>
+          <a:xfrm rot="3660000">
+            <a:off x="6233510" y="2039903"/>
+            <a:ext cx="1143000" cy="307777"/>
+          </a:xfrm>
+          <a:prstGeom prst="rect">
+            <a:avLst/>
+          </a:prstGeom>
+          <a:noFill/>
+        </p:spPr>
+        <p:txBody>
+          <a:bodyPr wrap="square" rtlCol="0">
+            <a:spAutoFit/>
+          </a:bodyPr>
+          <a:lstStyle/>
+          <a:p>
+            <a:pPr algn="ctr"/>
+            <a:r>
+              <a:rPr lang="en-US" sz="1400" i="1" dirty="0"/>
+              <a:t>Provenance</a:t>
+            </a:r>
+          </a:p>
+        </p:txBody>
+      </p:sp>
+      <p:cxnSp>
+        <p:nvCxnSpPr>
+          <p:cNvPr id="95" name="Straight Arrow Connector 94">
+            <a:extLst>
+              <a:ext uri="{FF2B5EF4-FFF2-40B4-BE49-F238E27FC236}">
+                <a16:creationId xmlns:a16="http://schemas.microsoft.com/office/drawing/2014/main" id="{978ED933-F731-4691-A156-2684B127D56E}"/>
+              </a:ext>
+            </a:extLst>
+          </p:cNvPr>
+          <p:cNvCxnSpPr>
+            <a:cxnSpLocks/>
+            <a:stCxn id="25" idx="3"/>
+            <a:endCxn id="83" idx="1"/>
+          </p:cNvCxnSpPr>
+          <p:nvPr/>
+        </p:nvCxnSpPr>
+        <p:spPr>
+          <a:xfrm>
+            <a:off x="6073528" y="5120640"/>
+            <a:ext cx="1461627" cy="1291052"/>
           </a:xfrm>
           <a:prstGeom prst="straightConnector1">
             <a:avLst/>
@@ -5676,674 +5770,24 @@
       </p:cxnSp>
       <p:cxnSp>
         <p:nvCxnSpPr>
-          <p:cNvPr id="64" name="Straight Arrow Connector 63">
-            <a:extLst>
-              <a:ext uri="{FF2B5EF4-FFF2-40B4-BE49-F238E27FC236}">
-                <a16:creationId xmlns:a16="http://schemas.microsoft.com/office/drawing/2014/main" id="{238DDEF4-228C-4B4A-AC5E-42F664A80E5A}"/>
+          <p:cNvPr id="115" name="Straight Arrow Connector 33">
+            <a:extLst>
+              <a:ext uri="{FF2B5EF4-FFF2-40B4-BE49-F238E27FC236}">
+                <a16:creationId xmlns:a16="http://schemas.microsoft.com/office/drawing/2014/main" id="{56EAA4A6-4635-439A-A8DB-7C5942F837AA}"/>
               </a:ext>
             </a:extLst>
           </p:cNvPr>
           <p:cNvCxnSpPr>
             <a:cxnSpLocks/>
+            <a:stCxn id="35" idx="3"/>
+            <a:endCxn id="54" idx="1"/>
           </p:cNvCxnSpPr>
           <p:nvPr/>
         </p:nvCxnSpPr>
         <p:spPr>
-          <a:xfrm>
-            <a:off x="449451" y="3449894"/>
-            <a:ext cx="1252667" cy="0"/>
-          </a:xfrm>
-          <a:prstGeom prst="straightConnector1">
-            <a:avLst/>
-          </a:prstGeom>
-          <a:ln>
-            <a:solidFill>
-              <a:schemeClr val="tx1"/>
-            </a:solidFill>
-            <a:tailEnd type="triangle"/>
-          </a:ln>
-        </p:spPr>
-        <p:style>
-          <a:lnRef idx="1">
-            <a:schemeClr val="accent1"/>
-          </a:lnRef>
-          <a:fillRef idx="0">
-            <a:schemeClr val="accent1"/>
-          </a:fillRef>
-          <a:effectRef idx="0">
-            <a:schemeClr val="accent1"/>
-          </a:effectRef>
-          <a:fontRef idx="minor">
-            <a:schemeClr val="tx1"/>
-          </a:fontRef>
-        </p:style>
-      </p:cxnSp>
-      <p:sp>
-        <p:nvSpPr>
-          <p:cNvPr id="10" name="TextBox 9">
-            <a:extLst>
-              <a:ext uri="{FF2B5EF4-FFF2-40B4-BE49-F238E27FC236}">
-                <a16:creationId xmlns:a16="http://schemas.microsoft.com/office/drawing/2014/main" id="{8E59F589-788D-4359-8E38-070D2915C1DF}"/>
-              </a:ext>
-            </a:extLst>
-          </p:cNvPr>
-          <p:cNvSpPr txBox="1"/>
-          <p:nvPr/>
-        </p:nvSpPr>
-        <p:spPr>
-          <a:xfrm>
-            <a:off x="1626541" y="2896849"/>
-            <a:ext cx="300104" cy="307777"/>
-          </a:xfrm>
-          <a:prstGeom prst="rect">
-            <a:avLst/>
-          </a:prstGeom>
-          <a:noFill/>
-        </p:spPr>
-        <p:txBody>
-          <a:bodyPr wrap="square" rtlCol="0">
-            <a:spAutoFit/>
-          </a:bodyPr>
-          <a:lstStyle/>
-          <a:p>
-            <a:r>
-              <a:rPr lang="en-US" sz="1400" dirty="0"/>
-              <a:t>a</a:t>
-            </a:r>
-          </a:p>
-        </p:txBody>
-      </p:sp>
-      <p:sp>
-        <p:nvSpPr>
-          <p:cNvPr id="65" name="TextBox 64">
-            <a:extLst>
-              <a:ext uri="{FF2B5EF4-FFF2-40B4-BE49-F238E27FC236}">
-                <a16:creationId xmlns:a16="http://schemas.microsoft.com/office/drawing/2014/main" id="{8958F671-A827-4225-A4E6-FBEE3E4B85B1}"/>
-              </a:ext>
-            </a:extLst>
-          </p:cNvPr>
-          <p:cNvSpPr txBox="1"/>
-          <p:nvPr/>
-        </p:nvSpPr>
-        <p:spPr>
-          <a:xfrm>
-            <a:off x="1636298" y="4288572"/>
-            <a:ext cx="300104" cy="307777"/>
-          </a:xfrm>
-          <a:prstGeom prst="rect">
-            <a:avLst/>
-          </a:prstGeom>
-          <a:noFill/>
-        </p:spPr>
-        <p:txBody>
-          <a:bodyPr wrap="square" rtlCol="0">
-            <a:spAutoFit/>
-          </a:bodyPr>
-          <a:lstStyle/>
-          <a:p>
-            <a:r>
-              <a:rPr lang="en-US" sz="1400" dirty="0"/>
-              <a:t>b</a:t>
-            </a:r>
-          </a:p>
-        </p:txBody>
-      </p:sp>
-      <p:sp>
-        <p:nvSpPr>
-          <p:cNvPr id="66" name="TextBox 65">
-            <a:extLst>
-              <a:ext uri="{FF2B5EF4-FFF2-40B4-BE49-F238E27FC236}">
-                <a16:creationId xmlns:a16="http://schemas.microsoft.com/office/drawing/2014/main" id="{931E3A27-F465-44CC-824D-EC245869C159}"/>
-              </a:ext>
-            </a:extLst>
-          </p:cNvPr>
-          <p:cNvSpPr txBox="1"/>
-          <p:nvPr/>
-        </p:nvSpPr>
-        <p:spPr>
-          <a:xfrm>
-            <a:off x="4376186" y="1788114"/>
-            <a:ext cx="300104" cy="307777"/>
-          </a:xfrm>
-          <a:prstGeom prst="rect">
-            <a:avLst/>
-          </a:prstGeom>
-          <a:noFill/>
-        </p:spPr>
-        <p:txBody>
-          <a:bodyPr wrap="square" rtlCol="0">
-            <a:spAutoFit/>
-          </a:bodyPr>
-          <a:lstStyle/>
-          <a:p>
-            <a:r>
-              <a:rPr lang="en-US" sz="1400" dirty="0"/>
-              <a:t>a</a:t>
-            </a:r>
-          </a:p>
-        </p:txBody>
-      </p:sp>
-      <p:sp>
-        <p:nvSpPr>
-          <p:cNvPr id="69" name="TextBox 68">
-            <a:extLst>
-              <a:ext uri="{FF2B5EF4-FFF2-40B4-BE49-F238E27FC236}">
-                <a16:creationId xmlns:a16="http://schemas.microsoft.com/office/drawing/2014/main" id="{ABDB5170-1F1E-41D3-BD11-67EC4F888FF4}"/>
-              </a:ext>
-            </a:extLst>
-          </p:cNvPr>
-          <p:cNvSpPr txBox="1"/>
-          <p:nvPr/>
-        </p:nvSpPr>
-        <p:spPr>
-          <a:xfrm>
-            <a:off x="7204976" y="3010917"/>
-            <a:ext cx="300104" cy="307777"/>
-          </a:xfrm>
-          <a:prstGeom prst="rect">
-            <a:avLst/>
-          </a:prstGeom>
-          <a:noFill/>
-        </p:spPr>
-        <p:txBody>
-          <a:bodyPr wrap="square" rtlCol="0">
-            <a:spAutoFit/>
-          </a:bodyPr>
-          <a:lstStyle/>
-          <a:p>
-            <a:r>
-              <a:rPr lang="en-US" sz="1400" dirty="0"/>
-              <a:t>d</a:t>
-            </a:r>
-          </a:p>
-        </p:txBody>
-      </p:sp>
-      <p:sp>
-        <p:nvSpPr>
-          <p:cNvPr id="70" name="TextBox 69">
-            <a:extLst>
-              <a:ext uri="{FF2B5EF4-FFF2-40B4-BE49-F238E27FC236}">
-                <a16:creationId xmlns:a16="http://schemas.microsoft.com/office/drawing/2014/main" id="{CA8767DC-C903-4522-9235-68BE38066C40}"/>
-              </a:ext>
-            </a:extLst>
-          </p:cNvPr>
-          <p:cNvSpPr txBox="1"/>
-          <p:nvPr/>
-        </p:nvSpPr>
-        <p:spPr>
-          <a:xfrm>
-            <a:off x="4376186" y="3826635"/>
-            <a:ext cx="300104" cy="307777"/>
-          </a:xfrm>
-          <a:prstGeom prst="rect">
-            <a:avLst/>
-          </a:prstGeom>
-          <a:noFill/>
-        </p:spPr>
-        <p:txBody>
-          <a:bodyPr wrap="square" rtlCol="0">
-            <a:spAutoFit/>
-          </a:bodyPr>
-          <a:lstStyle/>
-          <a:p>
-            <a:r>
-              <a:rPr lang="en-US" sz="1400" dirty="0"/>
-              <a:t>b</a:t>
-            </a:r>
-          </a:p>
-        </p:txBody>
-      </p:sp>
-      <p:sp>
-        <p:nvSpPr>
-          <p:cNvPr id="72" name="TextBox 71">
-            <a:extLst>
-              <a:ext uri="{FF2B5EF4-FFF2-40B4-BE49-F238E27FC236}">
-                <a16:creationId xmlns:a16="http://schemas.microsoft.com/office/drawing/2014/main" id="{36363267-D48A-4869-852E-FD8A7FA1B10D}"/>
-              </a:ext>
-            </a:extLst>
-          </p:cNvPr>
-          <p:cNvSpPr txBox="1"/>
-          <p:nvPr/>
-        </p:nvSpPr>
-        <p:spPr>
-          <a:xfrm>
-            <a:off x="7195367" y="1868852"/>
-            <a:ext cx="300104" cy="307777"/>
-          </a:xfrm>
-          <a:prstGeom prst="rect">
-            <a:avLst/>
-          </a:prstGeom>
-          <a:noFill/>
-        </p:spPr>
-        <p:txBody>
-          <a:bodyPr wrap="square" rtlCol="0">
-            <a:spAutoFit/>
-          </a:bodyPr>
-          <a:lstStyle/>
-          <a:p>
-            <a:r>
-              <a:rPr lang="en-US" sz="1400" dirty="0"/>
-              <a:t>c</a:t>
-            </a:r>
-          </a:p>
-        </p:txBody>
-      </p:sp>
-      <p:sp>
-        <p:nvSpPr>
-          <p:cNvPr id="73" name="TextBox 72">
-            <a:extLst>
-              <a:ext uri="{FF2B5EF4-FFF2-40B4-BE49-F238E27FC236}">
-                <a16:creationId xmlns:a16="http://schemas.microsoft.com/office/drawing/2014/main" id="{5B0940E3-24B9-49E9-A478-374231F3596A}"/>
-              </a:ext>
-            </a:extLst>
-          </p:cNvPr>
-          <p:cNvSpPr txBox="1"/>
-          <p:nvPr/>
-        </p:nvSpPr>
-        <p:spPr>
-          <a:xfrm>
-            <a:off x="7174660" y="4289691"/>
-            <a:ext cx="320811" cy="307777"/>
-          </a:xfrm>
-          <a:prstGeom prst="rect">
-            <a:avLst/>
-          </a:prstGeom>
-          <a:noFill/>
-        </p:spPr>
-        <p:txBody>
-          <a:bodyPr wrap="square" rtlCol="0">
-            <a:spAutoFit/>
-          </a:bodyPr>
-          <a:lstStyle/>
-          <a:p>
-            <a:r>
-              <a:rPr lang="en-US" sz="1400" dirty="0"/>
-              <a:t>e</a:t>
-            </a:r>
-          </a:p>
-        </p:txBody>
-      </p:sp>
-      <p:sp>
-        <p:nvSpPr>
-          <p:cNvPr id="76" name="TextBox 75">
-            <a:extLst>
-              <a:ext uri="{FF2B5EF4-FFF2-40B4-BE49-F238E27FC236}">
-                <a16:creationId xmlns:a16="http://schemas.microsoft.com/office/drawing/2014/main" id="{FEF447DE-1AB2-4FFD-B6EF-6F83F230C6F4}"/>
-              </a:ext>
-            </a:extLst>
-          </p:cNvPr>
-          <p:cNvSpPr txBox="1"/>
-          <p:nvPr/>
-        </p:nvSpPr>
-        <p:spPr>
-          <a:xfrm>
-            <a:off x="10365905" y="823937"/>
-            <a:ext cx="300104" cy="307777"/>
-          </a:xfrm>
-          <a:prstGeom prst="rect">
-            <a:avLst/>
-          </a:prstGeom>
-          <a:noFill/>
-        </p:spPr>
-        <p:txBody>
-          <a:bodyPr wrap="square" rtlCol="0">
-            <a:spAutoFit/>
-          </a:bodyPr>
-          <a:lstStyle/>
-          <a:p>
-            <a:r>
-              <a:rPr lang="en-US" sz="1400" dirty="0"/>
-              <a:t>g</a:t>
-            </a:r>
-          </a:p>
-        </p:txBody>
-      </p:sp>
-      <p:sp>
-        <p:nvSpPr>
-          <p:cNvPr id="77" name="TextBox 76">
-            <a:extLst>
-              <a:ext uri="{FF2B5EF4-FFF2-40B4-BE49-F238E27FC236}">
-                <a16:creationId xmlns:a16="http://schemas.microsoft.com/office/drawing/2014/main" id="{A7161291-7B97-471A-B81B-8A0755E7F950}"/>
-              </a:ext>
-            </a:extLst>
-          </p:cNvPr>
-          <p:cNvSpPr txBox="1"/>
-          <p:nvPr/>
-        </p:nvSpPr>
-        <p:spPr>
-          <a:xfrm>
-            <a:off x="10365905" y="1744269"/>
-            <a:ext cx="300104" cy="307777"/>
-          </a:xfrm>
-          <a:prstGeom prst="rect">
-            <a:avLst/>
-          </a:prstGeom>
-          <a:noFill/>
-        </p:spPr>
-        <p:txBody>
-          <a:bodyPr wrap="square" rtlCol="0">
-            <a:spAutoFit/>
-          </a:bodyPr>
-          <a:lstStyle/>
-          <a:p>
-            <a:r>
-              <a:rPr lang="en-US" sz="1400" dirty="0"/>
-              <a:t>h</a:t>
-            </a:r>
-          </a:p>
-        </p:txBody>
-      </p:sp>
-      <p:sp>
-        <p:nvSpPr>
-          <p:cNvPr id="78" name="TextBox 77">
-            <a:extLst>
-              <a:ext uri="{FF2B5EF4-FFF2-40B4-BE49-F238E27FC236}">
-                <a16:creationId xmlns:a16="http://schemas.microsoft.com/office/drawing/2014/main" id="{A1ABFD91-7281-4519-83F0-51A841509954}"/>
-              </a:ext>
-            </a:extLst>
-          </p:cNvPr>
-          <p:cNvSpPr txBox="1"/>
-          <p:nvPr/>
-        </p:nvSpPr>
-        <p:spPr>
-          <a:xfrm>
-            <a:off x="10363622" y="2880017"/>
-            <a:ext cx="300104" cy="307777"/>
-          </a:xfrm>
-          <a:prstGeom prst="rect">
-            <a:avLst/>
-          </a:prstGeom>
-          <a:noFill/>
-        </p:spPr>
-        <p:txBody>
-          <a:bodyPr wrap="square" rtlCol="0">
-            <a:spAutoFit/>
-          </a:bodyPr>
-          <a:lstStyle/>
-          <a:p>
-            <a:r>
-              <a:rPr lang="en-US" sz="1400" dirty="0" err="1"/>
-              <a:t>i</a:t>
-            </a:r>
-            <a:endParaRPr lang="en-US" sz="1400" dirty="0"/>
-          </a:p>
-        </p:txBody>
-      </p:sp>
-      <p:sp>
-        <p:nvSpPr>
-          <p:cNvPr id="79" name="TextBox 78">
-            <a:extLst>
-              <a:ext uri="{FF2B5EF4-FFF2-40B4-BE49-F238E27FC236}">
-                <a16:creationId xmlns:a16="http://schemas.microsoft.com/office/drawing/2014/main" id="{2EE75D90-17F0-4FD0-91FA-F061B062B26B}"/>
-              </a:ext>
-            </a:extLst>
-          </p:cNvPr>
-          <p:cNvSpPr txBox="1"/>
-          <p:nvPr/>
-        </p:nvSpPr>
-        <p:spPr>
-          <a:xfrm>
-            <a:off x="10397158" y="4253611"/>
-            <a:ext cx="320811" cy="307777"/>
-          </a:xfrm>
-          <a:prstGeom prst="rect">
-            <a:avLst/>
-          </a:prstGeom>
-          <a:noFill/>
-        </p:spPr>
-        <p:txBody>
-          <a:bodyPr wrap="square" rtlCol="0">
-            <a:spAutoFit/>
-          </a:bodyPr>
-          <a:lstStyle/>
-          <a:p>
-            <a:r>
-              <a:rPr lang="en-US" sz="1400" dirty="0"/>
-              <a:t>j</a:t>
-            </a:r>
-          </a:p>
-        </p:txBody>
-      </p:sp>
-      <p:sp>
-        <p:nvSpPr>
-          <p:cNvPr id="82" name="TextBox 81">
-            <a:extLst>
-              <a:ext uri="{FF2B5EF4-FFF2-40B4-BE49-F238E27FC236}">
-                <a16:creationId xmlns:a16="http://schemas.microsoft.com/office/drawing/2014/main" id="{55A3B22C-D6DF-4270-9A04-F8BE54AF0EAB}"/>
-              </a:ext>
-            </a:extLst>
-          </p:cNvPr>
-          <p:cNvSpPr txBox="1"/>
-          <p:nvPr/>
-        </p:nvSpPr>
-        <p:spPr>
-          <a:xfrm>
-            <a:off x="10371572" y="5794360"/>
-            <a:ext cx="300104" cy="307777"/>
-          </a:xfrm>
-          <a:prstGeom prst="rect">
-            <a:avLst/>
-          </a:prstGeom>
-          <a:noFill/>
-        </p:spPr>
-        <p:txBody>
-          <a:bodyPr wrap="square" rtlCol="0">
-            <a:spAutoFit/>
-          </a:bodyPr>
-          <a:lstStyle/>
-          <a:p>
-            <a:r>
-              <a:rPr lang="en-US" sz="1400" dirty="0"/>
-              <a:t>k</a:t>
-            </a:r>
-          </a:p>
-        </p:txBody>
-      </p:sp>
-      <p:sp>
-        <p:nvSpPr>
-          <p:cNvPr id="80" name="TextBox 79">
-            <a:extLst>
-              <a:ext uri="{FF2B5EF4-FFF2-40B4-BE49-F238E27FC236}">
-                <a16:creationId xmlns:a16="http://schemas.microsoft.com/office/drawing/2014/main" id="{DB542A89-5513-4C5A-B545-C688F2B99A95}"/>
-              </a:ext>
-            </a:extLst>
-          </p:cNvPr>
-          <p:cNvSpPr txBox="1"/>
-          <p:nvPr/>
-        </p:nvSpPr>
-        <p:spPr>
-          <a:xfrm>
-            <a:off x="7228511" y="1215263"/>
-            <a:ext cx="1568730" cy="369332"/>
-          </a:xfrm>
-          <a:prstGeom prst="rect">
-            <a:avLst/>
-          </a:prstGeom>
-        </p:spPr>
-        <p:style>
-          <a:lnRef idx="2">
-            <a:schemeClr val="dk1"/>
-          </a:lnRef>
-          <a:fillRef idx="1">
-            <a:schemeClr val="lt1"/>
-          </a:fillRef>
-          <a:effectRef idx="0">
-            <a:schemeClr val="dk1"/>
-          </a:effectRef>
-          <a:fontRef idx="minor">
-            <a:schemeClr val="dk1"/>
-          </a:fontRef>
-        </p:style>
-        <p:txBody>
-          <a:bodyPr wrap="square" lIns="0" rIns="0" rtlCol="0">
-            <a:spAutoFit/>
-          </a:bodyPr>
-          <a:lstStyle/>
-          <a:p>
-            <a:pPr algn="ctr"/>
-            <a:r>
-              <a:rPr lang="en-US" dirty="0">
-                <a:solidFill>
-                  <a:schemeClr val="tx1"/>
-                </a:solidFill>
-              </a:rPr>
-              <a:t>Database</a:t>
-            </a:r>
-          </a:p>
-        </p:txBody>
-      </p:sp>
-      <p:sp>
-        <p:nvSpPr>
-          <p:cNvPr id="81" name="TextBox 80">
-            <a:extLst>
-              <a:ext uri="{FF2B5EF4-FFF2-40B4-BE49-F238E27FC236}">
-                <a16:creationId xmlns:a16="http://schemas.microsoft.com/office/drawing/2014/main" id="{E852C4F0-FF1E-4633-BA5D-7FE990DE6B5F}"/>
-              </a:ext>
-            </a:extLst>
-          </p:cNvPr>
-          <p:cNvSpPr txBox="1"/>
-          <p:nvPr/>
-        </p:nvSpPr>
-        <p:spPr>
-          <a:xfrm>
-            <a:off x="7190161" y="969169"/>
-            <a:ext cx="300104" cy="307777"/>
-          </a:xfrm>
-          <a:prstGeom prst="rect">
-            <a:avLst/>
-          </a:prstGeom>
-          <a:noFill/>
-        </p:spPr>
-        <p:txBody>
-          <a:bodyPr wrap="square" rtlCol="0">
-            <a:spAutoFit/>
-          </a:bodyPr>
-          <a:lstStyle/>
-          <a:p>
-            <a:r>
-              <a:rPr lang="en-US" sz="1400" dirty="0"/>
-              <a:t>a</a:t>
-            </a:r>
-          </a:p>
-        </p:txBody>
-      </p:sp>
-      <p:sp>
-        <p:nvSpPr>
-          <p:cNvPr id="83" name="TextBox 82">
-            <a:extLst>
-              <a:ext uri="{FF2B5EF4-FFF2-40B4-BE49-F238E27FC236}">
-                <a16:creationId xmlns:a16="http://schemas.microsoft.com/office/drawing/2014/main" id="{8F8C12C3-066C-45F1-A75D-4347B99FB119}"/>
-              </a:ext>
-            </a:extLst>
-          </p:cNvPr>
-          <p:cNvSpPr txBox="1"/>
-          <p:nvPr/>
-        </p:nvSpPr>
-        <p:spPr>
-          <a:xfrm>
-            <a:off x="7238657" y="5779412"/>
-            <a:ext cx="1562443" cy="923330"/>
-          </a:xfrm>
-          <a:prstGeom prst="rect">
-            <a:avLst/>
-          </a:prstGeom>
-        </p:spPr>
-        <p:style>
-          <a:lnRef idx="2">
-            <a:schemeClr val="dk1"/>
-          </a:lnRef>
-          <a:fillRef idx="1">
-            <a:schemeClr val="lt1"/>
-          </a:fillRef>
-          <a:effectRef idx="0">
-            <a:schemeClr val="dk1"/>
-          </a:effectRef>
-          <a:fontRef idx="minor">
-            <a:schemeClr val="dk1"/>
-          </a:fontRef>
-        </p:style>
-        <p:txBody>
-          <a:bodyPr wrap="square" lIns="0" rIns="0" rtlCol="0">
-            <a:spAutoFit/>
-          </a:bodyPr>
-          <a:lstStyle/>
-          <a:p>
-            <a:pPr algn="ctr"/>
-            <a:r>
-              <a:rPr lang="en-US" dirty="0">
-                <a:solidFill>
-                  <a:schemeClr val="tx1"/>
-                </a:solidFill>
-              </a:rPr>
-              <a:t>Monitored</a:t>
-            </a:r>
-          </a:p>
-          <a:p>
-            <a:pPr algn="ctr"/>
-            <a:r>
-              <a:rPr lang="en-US" dirty="0">
-                <a:solidFill>
-                  <a:schemeClr val="tx1"/>
-                </a:solidFill>
-              </a:rPr>
-              <a:t>ledger with consensus</a:t>
-            </a:r>
-          </a:p>
-        </p:txBody>
-      </p:sp>
-      <p:sp>
-        <p:nvSpPr>
-          <p:cNvPr id="84" name="TextBox 83">
-            <a:extLst>
-              <a:ext uri="{FF2B5EF4-FFF2-40B4-BE49-F238E27FC236}">
-                <a16:creationId xmlns:a16="http://schemas.microsoft.com/office/drawing/2014/main" id="{7AF5D870-4D70-447E-90F8-280AA6C44D55}"/>
-              </a:ext>
-            </a:extLst>
-          </p:cNvPr>
-          <p:cNvSpPr txBox="1"/>
-          <p:nvPr/>
-        </p:nvSpPr>
-        <p:spPr>
-          <a:xfrm>
-            <a:off x="7185119" y="5503698"/>
-            <a:ext cx="300104" cy="307777"/>
-          </a:xfrm>
-          <a:prstGeom prst="rect">
-            <a:avLst/>
-          </a:prstGeom>
-          <a:noFill/>
-        </p:spPr>
-        <p:txBody>
-          <a:bodyPr wrap="square" rtlCol="0">
-            <a:spAutoFit/>
-          </a:bodyPr>
-          <a:lstStyle/>
-          <a:p>
-            <a:r>
-              <a:rPr lang="en-US" sz="1400" dirty="0"/>
-              <a:t>f</a:t>
-            </a:r>
-          </a:p>
-        </p:txBody>
-      </p:sp>
-      <p:cxnSp>
-        <p:nvCxnSpPr>
-          <p:cNvPr id="85" name="Straight Arrow Connector 84">
-            <a:extLst>
-              <a:ext uri="{FF2B5EF4-FFF2-40B4-BE49-F238E27FC236}">
-                <a16:creationId xmlns:a16="http://schemas.microsoft.com/office/drawing/2014/main" id="{A70A06E1-A448-42E9-8F87-65D75B446BBE}"/>
-              </a:ext>
-            </a:extLst>
-          </p:cNvPr>
-          <p:cNvCxnSpPr>
-            <a:cxnSpLocks/>
-          </p:cNvCxnSpPr>
-          <p:nvPr/>
-        </p:nvCxnSpPr>
-        <p:spPr>
-          <a:xfrm>
-            <a:off x="3264212" y="3346648"/>
-            <a:ext cx="3997779" cy="393109"/>
+          <a:xfrm flipV="1">
+            <a:off x="8998195" y="5120640"/>
+            <a:ext cx="1446665" cy="3908"/>
           </a:xfrm>
           <a:prstGeom prst="straightConnector1">
             <a:avLst/>
@@ -6372,23 +5816,24 @@
       </p:cxnSp>
       <p:cxnSp>
         <p:nvCxnSpPr>
-          <p:cNvPr id="86" name="Straight Arrow Connector 85">
-            <a:extLst>
-              <a:ext uri="{FF2B5EF4-FFF2-40B4-BE49-F238E27FC236}">
-                <a16:creationId xmlns:a16="http://schemas.microsoft.com/office/drawing/2014/main" id="{147371C3-B149-4F60-A231-3617515EB559}"/>
+          <p:cNvPr id="120" name="Straight Arrow Connector 33">
+            <a:extLst>
+              <a:ext uri="{FF2B5EF4-FFF2-40B4-BE49-F238E27FC236}">
+                <a16:creationId xmlns:a16="http://schemas.microsoft.com/office/drawing/2014/main" id="{4D83DDC1-05DF-4609-B3A0-B28D3B626769}"/>
               </a:ext>
             </a:extLst>
           </p:cNvPr>
           <p:cNvCxnSpPr>
             <a:cxnSpLocks/>
-            <a:endCxn id="80" idx="1"/>
+            <a:stCxn id="83" idx="3"/>
+            <a:endCxn id="57" idx="1"/>
           </p:cNvCxnSpPr>
           <p:nvPr/>
         </p:nvCxnSpPr>
         <p:spPr>
-          <a:xfrm flipV="1">
-            <a:off x="5976630" y="1399929"/>
-            <a:ext cx="1251881" cy="849582"/>
+          <a:xfrm>
+            <a:off x="8998195" y="6411692"/>
+            <a:ext cx="1452902" cy="183"/>
           </a:xfrm>
           <a:prstGeom prst="straightConnector1">
             <a:avLst/>
@@ -6417,10 +5862,10 @@
       </p:cxnSp>
       <p:sp>
         <p:nvSpPr>
-          <p:cNvPr id="88" name="TextBox 87">
-            <a:extLst>
-              <a:ext uri="{FF2B5EF4-FFF2-40B4-BE49-F238E27FC236}">
-                <a16:creationId xmlns:a16="http://schemas.microsoft.com/office/drawing/2014/main" id="{7B105741-7B48-4FD4-9184-8949FCB9E4F9}"/>
+          <p:cNvPr id="124" name="TextBox 123">
+            <a:extLst>
+              <a:ext uri="{FF2B5EF4-FFF2-40B4-BE49-F238E27FC236}">
+                <a16:creationId xmlns:a16="http://schemas.microsoft.com/office/drawing/2014/main" id="{C311BCA0-7701-4152-AB85-2FD9DC3B11D1}"/>
               </a:ext>
             </a:extLst>
           </p:cNvPr>
@@ -6428,9 +5873,9 @@
           <p:nvPr/>
         </p:nvSpPr>
         <p:spPr>
-          <a:xfrm rot="19583109">
-            <a:off x="5765529" y="1581564"/>
-            <a:ext cx="1562094" cy="307777"/>
+          <a:xfrm rot="2460000">
+            <a:off x="6233510" y="5395699"/>
+            <a:ext cx="1143000" cy="307777"/>
           </a:xfrm>
           <a:prstGeom prst="rect">
             <a:avLst/>
@@ -6446,29 +5891,198 @@
             <a:pPr algn="ctr"/>
             <a:r>
               <a:rPr lang="en-US" sz="1400" i="1" dirty="0"/>
-              <a:t>Nothing</a:t>
+              <a:t>Provenance</a:t>
+            </a:r>
+          </a:p>
+        </p:txBody>
+      </p:sp>
+      <p:sp>
+        <p:nvSpPr>
+          <p:cNvPr id="96" name="TextBox 95">
+            <a:extLst>
+              <a:ext uri="{FF2B5EF4-FFF2-40B4-BE49-F238E27FC236}">
+                <a16:creationId xmlns:a16="http://schemas.microsoft.com/office/drawing/2014/main" id="{C26A52F5-7D8E-4441-9049-1E25D93EFCC1}"/>
+              </a:ext>
+            </a:extLst>
+          </p:cNvPr>
+          <p:cNvSpPr txBox="1"/>
+          <p:nvPr/>
+        </p:nvSpPr>
+        <p:spPr>
+          <a:xfrm>
+            <a:off x="9033458" y="4381163"/>
+            <a:ext cx="1371600" cy="738664"/>
+          </a:xfrm>
+          <a:prstGeom prst="rect">
+            <a:avLst/>
+          </a:prstGeom>
+          <a:noFill/>
+        </p:spPr>
+        <p:txBody>
+          <a:bodyPr wrap="square" rtlCol="0">
+            <a:spAutoFit/>
+          </a:bodyPr>
+          <a:lstStyle/>
+          <a:p>
+            <a:pPr marL="137160" indent="-137160">
+              <a:buFont typeface="Arial" panose="020B0604020202020204" pitchFamily="34" charset="0"/>
+              <a:buChar char="•"/>
+            </a:pPr>
+            <a:r>
+              <a:rPr lang="en-US" sz="1400" b="1" i="1" dirty="0"/>
+              <a:t>Data loss</a:t>
+            </a:r>
+          </a:p>
+          <a:p>
+            <a:pPr marL="137160" indent="-137160">
+              <a:buFont typeface="Arial" panose="020B0604020202020204" pitchFamily="34" charset="0"/>
+              <a:buChar char="•"/>
+            </a:pPr>
+            <a:r>
+              <a:rPr lang="en-US" sz="1400" b="1" i="1" dirty="0"/>
+              <a:t>Malicious</a:t>
+            </a:r>
+            <a:br>
+              <a:rPr lang="en-US" sz="1400" b="1" i="1" dirty="0"/>
+            </a:br>
+            <a:r>
+              <a:rPr lang="en-US" sz="1400" b="1" i="1" dirty="0"/>
+              <a:t>updates</a:t>
+            </a:r>
+          </a:p>
+        </p:txBody>
+      </p:sp>
+      <p:sp>
+        <p:nvSpPr>
+          <p:cNvPr id="97" name="TextBox 96">
+            <a:extLst>
+              <a:ext uri="{FF2B5EF4-FFF2-40B4-BE49-F238E27FC236}">
+                <a16:creationId xmlns:a16="http://schemas.microsoft.com/office/drawing/2014/main" id="{65C323B5-C61E-1A4F-A71F-6FB60749635D}"/>
+              </a:ext>
+            </a:extLst>
+          </p:cNvPr>
+          <p:cNvSpPr txBox="1"/>
+          <p:nvPr/>
+        </p:nvSpPr>
+        <p:spPr>
+          <a:xfrm>
+            <a:off x="9033458" y="3089115"/>
+            <a:ext cx="1371600" cy="738664"/>
+          </a:xfrm>
+          <a:prstGeom prst="rect">
+            <a:avLst/>
+          </a:prstGeom>
+          <a:noFill/>
+        </p:spPr>
+        <p:txBody>
+          <a:bodyPr wrap="square" rtlCol="0">
+            <a:spAutoFit/>
+          </a:bodyPr>
+          <a:lstStyle/>
+          <a:p>
+            <a:pPr marL="137160" indent="-137160">
+              <a:buFont typeface="Arial" panose="020B0604020202020204" pitchFamily="34" charset="0"/>
+              <a:buChar char="•"/>
+            </a:pPr>
+            <a:r>
+              <a:rPr lang="en-US" sz="1400" b="1" i="1" dirty="0"/>
+              <a:t>Data loss</a:t>
+            </a:r>
+          </a:p>
+          <a:p>
+            <a:pPr marL="137160" indent="-137160">
+              <a:buFont typeface="Arial" panose="020B0604020202020204" pitchFamily="34" charset="0"/>
+              <a:buChar char="•"/>
+            </a:pPr>
+            <a:r>
+              <a:rPr lang="en-US" sz="1400" b="1" i="1" dirty="0"/>
+              <a:t>Undetected</a:t>
+            </a:r>
+            <a:br>
+              <a:rPr lang="en-US" sz="1400" b="1" i="1" dirty="0"/>
+            </a:br>
+            <a:r>
+              <a:rPr lang="en-US" sz="1400" b="1" i="1" dirty="0"/>
+              <a:t>modification</a:t>
+            </a:r>
+          </a:p>
+        </p:txBody>
+      </p:sp>
+      <p:sp>
+        <p:nvSpPr>
+          <p:cNvPr id="98" name="TextBox 97">
+            <a:extLst>
+              <a:ext uri="{FF2B5EF4-FFF2-40B4-BE49-F238E27FC236}">
+                <a16:creationId xmlns:a16="http://schemas.microsoft.com/office/drawing/2014/main" id="{8253FE92-E483-864F-9991-F6D688AFD9FC}"/>
+              </a:ext>
+            </a:extLst>
+          </p:cNvPr>
+          <p:cNvSpPr txBox="1"/>
+          <p:nvPr/>
+        </p:nvSpPr>
+        <p:spPr>
+          <a:xfrm>
+            <a:off x="9033458" y="5663405"/>
+            <a:ext cx="1371600" cy="738664"/>
+          </a:xfrm>
+          <a:prstGeom prst="rect">
+            <a:avLst/>
+          </a:prstGeom>
+          <a:noFill/>
+        </p:spPr>
+        <p:txBody>
+          <a:bodyPr wrap="square" rtlCol="0">
+            <a:spAutoFit/>
+          </a:bodyPr>
+          <a:lstStyle/>
+          <a:p>
+            <a:pPr marL="137160" indent="-137160">
+              <a:buFont typeface="Arial" panose="020B0604020202020204" pitchFamily="34" charset="0"/>
+              <a:buChar char="•"/>
+            </a:pPr>
+            <a:r>
+              <a:rPr lang="en-US" sz="1400" b="1" i="1" dirty="0"/>
+              <a:t>Data loss</a:t>
+            </a:r>
+          </a:p>
+          <a:p>
+            <a:pPr marL="137160" indent="-137160">
+              <a:buFont typeface="Arial" panose="020B0604020202020204" pitchFamily="34" charset="0"/>
+              <a:buChar char="•"/>
+            </a:pPr>
+            <a:r>
+              <a:rPr lang="en-US" sz="1400" b="1" i="1" dirty="0"/>
+              <a:t>Malicious</a:t>
+            </a:r>
+            <a:br>
+              <a:rPr lang="en-US" sz="1400" b="1" i="1" dirty="0"/>
+            </a:br>
+            <a:r>
+              <a:rPr lang="en-US" sz="1400" b="1" i="1" dirty="0"/>
+              <a:t>updates</a:t>
             </a:r>
           </a:p>
         </p:txBody>
       </p:sp>
       <p:cxnSp>
         <p:nvCxnSpPr>
-          <p:cNvPr id="89" name="Straight Arrow Connector 88">
-            <a:extLst>
-              <a:ext uri="{FF2B5EF4-FFF2-40B4-BE49-F238E27FC236}">
-                <a16:creationId xmlns:a16="http://schemas.microsoft.com/office/drawing/2014/main" id="{0D2A6C58-8683-4F1A-A6C0-155F85D73905}"/>
+          <p:cNvPr id="126" name="Straight Arrow Connector 125">
+            <a:extLst>
+              <a:ext uri="{FF2B5EF4-FFF2-40B4-BE49-F238E27FC236}">
+                <a16:creationId xmlns:a16="http://schemas.microsoft.com/office/drawing/2014/main" id="{2413E3E4-10E3-CC4D-87B0-FE1DF2FE03C8}"/>
               </a:ext>
             </a:extLst>
           </p:cNvPr>
           <p:cNvCxnSpPr>
             <a:cxnSpLocks/>
+            <a:endCxn id="8" idx="1"/>
           </p:cNvCxnSpPr>
           <p:nvPr/>
         </p:nvCxnSpPr>
         <p:spPr>
           <a:xfrm>
-            <a:off x="5986833" y="2212153"/>
-            <a:ext cx="1255333" cy="1527604"/>
+            <a:off x="294534" y="1249764"/>
+            <a:ext cx="1407584" cy="0"/>
           </a:xfrm>
           <a:prstGeom prst="straightConnector1">
             <a:avLst/>
@@ -6497,10 +6111,10 @@
       </p:cxnSp>
       <p:sp>
         <p:nvSpPr>
-          <p:cNvPr id="92" name="TextBox 91">
-            <a:extLst>
-              <a:ext uri="{FF2B5EF4-FFF2-40B4-BE49-F238E27FC236}">
-                <a16:creationId xmlns:a16="http://schemas.microsoft.com/office/drawing/2014/main" id="{E254746F-8631-4461-8A48-B99924C78776}"/>
+          <p:cNvPr id="129" name="TextBox 128">
+            <a:extLst>
+              <a:ext uri="{FF2B5EF4-FFF2-40B4-BE49-F238E27FC236}">
+                <a16:creationId xmlns:a16="http://schemas.microsoft.com/office/drawing/2014/main" id="{97D237CE-5D80-A64F-88E6-706E1AE5A8EE}"/>
               </a:ext>
             </a:extLst>
           </p:cNvPr>
@@ -6508,9 +6122,9 @@
           <p:nvPr/>
         </p:nvSpPr>
         <p:spPr>
-          <a:xfrm rot="3095280">
-            <a:off x="5935612" y="2750033"/>
-            <a:ext cx="1562094" cy="307777"/>
+          <a:xfrm>
+            <a:off x="374352" y="940127"/>
+            <a:ext cx="1247946" cy="307777"/>
           </a:xfrm>
           <a:prstGeom prst="rect">
             <a:avLst/>
@@ -6525,64 +6139,18 @@
           <a:p>
             <a:pPr algn="ctr"/>
             <a:r>
-              <a:rPr lang="en-US" sz="1400" i="1" dirty="0"/>
-              <a:t>Provenance</a:t>
-            </a:r>
-          </a:p>
-        </p:txBody>
-      </p:sp>
-      <p:cxnSp>
-        <p:nvCxnSpPr>
-          <p:cNvPr id="95" name="Straight Arrow Connector 94">
-            <a:extLst>
-              <a:ext uri="{FF2B5EF4-FFF2-40B4-BE49-F238E27FC236}">
-                <a16:creationId xmlns:a16="http://schemas.microsoft.com/office/drawing/2014/main" id="{978ED933-F731-4691-A156-2684B127D56E}"/>
-              </a:ext>
-            </a:extLst>
-          </p:cNvPr>
-          <p:cNvCxnSpPr>
-            <a:cxnSpLocks/>
-            <a:stCxn id="25" idx="3"/>
-            <a:endCxn id="83" idx="1"/>
-          </p:cNvCxnSpPr>
-          <p:nvPr/>
-        </p:nvCxnSpPr>
-        <p:spPr>
-          <a:xfrm>
-            <a:off x="5976630" y="4412859"/>
-            <a:ext cx="1262027" cy="1828218"/>
-          </a:xfrm>
-          <a:prstGeom prst="straightConnector1">
-            <a:avLst/>
-          </a:prstGeom>
-          <a:ln>
-            <a:solidFill>
-              <a:schemeClr val="tx1"/>
-            </a:solidFill>
-            <a:tailEnd type="triangle"/>
-          </a:ln>
-        </p:spPr>
-        <p:style>
-          <a:lnRef idx="1">
-            <a:schemeClr val="accent1"/>
-          </a:lnRef>
-          <a:fillRef idx="0">
-            <a:schemeClr val="accent1"/>
-          </a:fillRef>
-          <a:effectRef idx="0">
-            <a:schemeClr val="accent1"/>
-          </a:effectRef>
-          <a:fontRef idx="minor">
-            <a:schemeClr val="tx1"/>
-          </a:fontRef>
-        </p:style>
-      </p:cxnSp>
-      <p:sp>
-        <p:nvSpPr>
-          <p:cNvPr id="108" name="TextBox 107">
-            <a:extLst>
-              <a:ext uri="{FF2B5EF4-FFF2-40B4-BE49-F238E27FC236}">
-                <a16:creationId xmlns:a16="http://schemas.microsoft.com/office/drawing/2014/main" id="{AF9CD2C0-06B6-487C-AE62-1FA7AA233A5E}"/>
+              <a:rPr lang="en-US" sz="1400" dirty="0"/>
+              <a:t>Centralized</a:t>
+            </a:r>
+          </a:p>
+        </p:txBody>
+      </p:sp>
+      <p:sp>
+        <p:nvSpPr>
+          <p:cNvPr id="131" name="TextBox 130">
+            <a:extLst>
+              <a:ext uri="{FF2B5EF4-FFF2-40B4-BE49-F238E27FC236}">
+                <a16:creationId xmlns:a16="http://schemas.microsoft.com/office/drawing/2014/main" id="{83E3108E-C58D-E044-BFC6-0B7D37ED1A89}"/>
               </a:ext>
             </a:extLst>
           </p:cNvPr>
@@ -6591,8 +6159,8 @@
         </p:nvSpPr>
         <p:spPr>
           <a:xfrm>
-            <a:off x="8796321" y="2739979"/>
-            <a:ext cx="1693562" cy="954107"/>
+            <a:off x="3319262" y="4820557"/>
+            <a:ext cx="1143000" cy="307777"/>
           </a:xfrm>
           <a:prstGeom prst="rect">
             <a:avLst/>
@@ -6605,91 +6173,20 @@
           </a:bodyPr>
           <a:lstStyle/>
           <a:p>
-            <a:pPr marL="137160" indent="-137160">
-              <a:buFont typeface="Arial" panose="020B0604020202020204" pitchFamily="34" charset="0"/>
-              <a:buChar char="•"/>
-            </a:pPr>
-            <a:r>
-              <a:rPr lang="en-US" sz="1400" b="1" i="1" dirty="0"/>
-              <a:t>Accidental data</a:t>
-            </a:r>
-            <a:br>
-              <a:rPr lang="en-US" sz="1400" b="1" i="1" dirty="0"/>
-            </a:br>
-            <a:r>
-              <a:rPr lang="en-US" sz="1400" b="1" i="1" dirty="0"/>
-              <a:t>loss</a:t>
-            </a:r>
-          </a:p>
-          <a:p>
-            <a:pPr marL="137160" indent="-137160">
-              <a:buFont typeface="Arial" panose="020B0604020202020204" pitchFamily="34" charset="0"/>
-              <a:buChar char="•"/>
-            </a:pPr>
-            <a:r>
-              <a:rPr lang="en-US" sz="1400" b="1" i="1" dirty="0"/>
-              <a:t>Undetected</a:t>
-            </a:r>
-            <a:br>
-              <a:rPr lang="en-US" sz="1400" b="1" i="1" dirty="0"/>
-            </a:br>
-            <a:r>
-              <a:rPr lang="en-US" sz="1400" b="1" i="1" dirty="0"/>
-              <a:t>modification</a:t>
-            </a:r>
-          </a:p>
-        </p:txBody>
-      </p:sp>
-      <p:cxnSp>
-        <p:nvCxnSpPr>
-          <p:cNvPr id="115" name="Straight Arrow Connector 33">
-            <a:extLst>
-              <a:ext uri="{FF2B5EF4-FFF2-40B4-BE49-F238E27FC236}">
-                <a16:creationId xmlns:a16="http://schemas.microsoft.com/office/drawing/2014/main" id="{56EAA4A6-4635-439A-A8DB-7C5942F837AA}"/>
-              </a:ext>
-            </a:extLst>
-          </p:cNvPr>
-          <p:cNvCxnSpPr>
-            <a:cxnSpLocks/>
-          </p:cNvCxnSpPr>
-          <p:nvPr/>
-        </p:nvCxnSpPr>
-        <p:spPr>
-          <a:xfrm flipV="1">
-            <a:off x="8800750" y="4984624"/>
-            <a:ext cx="1637873" cy="0"/>
-          </a:xfrm>
-          <a:prstGeom prst="straightConnector1">
-            <a:avLst/>
-          </a:prstGeom>
-          <a:ln>
-            <a:solidFill>
-              <a:schemeClr val="tx1"/>
-            </a:solidFill>
-            <a:tailEnd type="triangle"/>
-          </a:ln>
-        </p:spPr>
-        <p:style>
-          <a:lnRef idx="1">
-            <a:schemeClr val="accent1"/>
-          </a:lnRef>
-          <a:fillRef idx="0">
-            <a:schemeClr val="accent1"/>
-          </a:fillRef>
-          <a:effectRef idx="0">
-            <a:schemeClr val="accent1"/>
-          </a:effectRef>
-          <a:fontRef idx="minor">
-            <a:schemeClr val="tx1"/>
-          </a:fontRef>
-        </p:style>
-      </p:cxnSp>
-      <p:sp>
-        <p:nvSpPr>
-          <p:cNvPr id="116" name="TextBox 115">
-            <a:extLst>
-              <a:ext uri="{FF2B5EF4-FFF2-40B4-BE49-F238E27FC236}">
-                <a16:creationId xmlns:a16="http://schemas.microsoft.com/office/drawing/2014/main" id="{52D4D6E3-4964-4D2E-A00B-195263EAFAB1}"/>
+            <a:pPr algn="ctr"/>
+            <a:r>
+              <a:rPr lang="en-US" sz="1400" b="1" dirty="0"/>
+              <a:t>Maintainer</a:t>
+            </a:r>
+          </a:p>
+        </p:txBody>
+      </p:sp>
+      <p:sp>
+        <p:nvSpPr>
+          <p:cNvPr id="132" name="TextBox 131">
+            <a:extLst>
+              <a:ext uri="{FF2B5EF4-FFF2-40B4-BE49-F238E27FC236}">
+                <a16:creationId xmlns:a16="http://schemas.microsoft.com/office/drawing/2014/main" id="{8AD323B4-647F-0E40-9835-C877E1F8352C}"/>
               </a:ext>
             </a:extLst>
           </p:cNvPr>
@@ -6697,9 +6194,9 @@
           <p:nvPr/>
         </p:nvSpPr>
         <p:spPr>
-          <a:xfrm>
-            <a:off x="8796321" y="3840481"/>
-            <a:ext cx="1702566" cy="1169551"/>
+          <a:xfrm rot="660000">
+            <a:off x="3319262" y="5406434"/>
+            <a:ext cx="1143000" cy="307777"/>
           </a:xfrm>
           <a:prstGeom prst="rect">
             <a:avLst/>
@@ -6712,103 +6209,20 @@
           </a:bodyPr>
           <a:lstStyle/>
           <a:p>
-            <a:pPr marL="137160" indent="-137160">
-              <a:buFont typeface="Arial" panose="020B0604020202020204" pitchFamily="34" charset="0"/>
-              <a:buChar char="•"/>
-            </a:pPr>
-            <a:r>
-              <a:rPr lang="en-US" sz="1400" b="1" i="1" dirty="0"/>
-              <a:t>Accidental data</a:t>
-            </a:r>
-            <a:br>
-              <a:rPr lang="en-US" sz="1400" b="1" i="1" dirty="0"/>
-            </a:br>
-            <a:r>
-              <a:rPr lang="en-US" sz="1400" b="1" i="1" dirty="0"/>
-              <a:t>loss</a:t>
-            </a:r>
-          </a:p>
-          <a:p>
-            <a:pPr marL="137160" indent="-137160">
-              <a:buFont typeface="Arial" panose="020B0604020202020204" pitchFamily="34" charset="0"/>
-              <a:buChar char="•"/>
-            </a:pPr>
-            <a:r>
-              <a:rPr lang="en-US" sz="1400" b="1" i="1" dirty="0"/>
-              <a:t>Malicious updates</a:t>
-            </a:r>
-          </a:p>
-          <a:p>
-            <a:pPr marL="137160" indent="-137160">
-              <a:buFont typeface="Arial" panose="020B0604020202020204" pitchFamily="34" charset="0"/>
-              <a:buChar char="•"/>
-            </a:pPr>
-            <a:r>
-              <a:rPr lang="en-US" sz="1400" b="1" i="1" dirty="0"/>
-              <a:t>Malicious deletes</a:t>
-            </a:r>
-            <a:br>
-              <a:rPr lang="en-US" sz="1400" b="1" i="1" dirty="0"/>
-            </a:br>
-            <a:r>
-              <a:rPr lang="en-US" sz="1400" b="1" i="1" dirty="0"/>
-              <a:t>or rollback</a:t>
-            </a:r>
-          </a:p>
-        </p:txBody>
-      </p:sp>
-      <p:cxnSp>
-        <p:nvCxnSpPr>
-          <p:cNvPr id="120" name="Straight Arrow Connector 33">
-            <a:extLst>
-              <a:ext uri="{FF2B5EF4-FFF2-40B4-BE49-F238E27FC236}">
-                <a16:creationId xmlns:a16="http://schemas.microsoft.com/office/drawing/2014/main" id="{4D83DDC1-05DF-4609-B3A0-B28D3B626769}"/>
-              </a:ext>
-            </a:extLst>
-          </p:cNvPr>
-          <p:cNvCxnSpPr>
-            <a:cxnSpLocks/>
-            <a:stCxn id="83" idx="3"/>
-            <a:endCxn id="57" idx="1"/>
-          </p:cNvCxnSpPr>
-          <p:nvPr/>
-        </p:nvCxnSpPr>
-        <p:spPr>
-          <a:xfrm flipV="1">
-            <a:off x="8801100" y="6234657"/>
-            <a:ext cx="1637523" cy="6420"/>
-          </a:xfrm>
-          <a:prstGeom prst="straightConnector1">
-            <a:avLst/>
-          </a:prstGeom>
-          <a:ln>
-            <a:solidFill>
-              <a:schemeClr val="tx1"/>
-            </a:solidFill>
-            <a:tailEnd type="triangle"/>
-          </a:ln>
-        </p:spPr>
-        <p:style>
-          <a:lnRef idx="1">
-            <a:schemeClr val="accent1"/>
-          </a:lnRef>
-          <a:fillRef idx="0">
-            <a:schemeClr val="accent1"/>
-          </a:fillRef>
-          <a:effectRef idx="0">
-            <a:schemeClr val="accent1"/>
-          </a:effectRef>
-          <a:fontRef idx="minor">
-            <a:schemeClr val="tx1"/>
-          </a:fontRef>
-        </p:style>
-      </p:cxnSp>
-      <p:sp>
-        <p:nvSpPr>
-          <p:cNvPr id="121" name="TextBox 120">
-            <a:extLst>
-              <a:ext uri="{FF2B5EF4-FFF2-40B4-BE49-F238E27FC236}">
-                <a16:creationId xmlns:a16="http://schemas.microsoft.com/office/drawing/2014/main" id="{3C4D3AEF-30CD-4962-9B8D-FD3AA5BF14DA}"/>
+            <a:pPr algn="ctr"/>
+            <a:r>
+              <a:rPr lang="en-US" sz="1400" b="1" dirty="0"/>
+              <a:t>System</a:t>
+            </a:r>
+          </a:p>
+        </p:txBody>
+      </p:sp>
+      <p:sp>
+        <p:nvSpPr>
+          <p:cNvPr id="134" name="TextBox 133">
+            <a:extLst>
+              <a:ext uri="{FF2B5EF4-FFF2-40B4-BE49-F238E27FC236}">
+                <a16:creationId xmlns:a16="http://schemas.microsoft.com/office/drawing/2014/main" id="{8C9FB575-6360-EA4B-87DD-EF3578386EFB}"/>
               </a:ext>
             </a:extLst>
           </p:cNvPr>
@@ -6816,9 +6230,9 @@
           <p:nvPr/>
         </p:nvSpPr>
         <p:spPr>
-          <a:xfrm>
-            <a:off x="8796320" y="5126178"/>
-            <a:ext cx="1702567" cy="1169551"/>
+          <a:xfrm rot="660000">
+            <a:off x="6233510" y="5960039"/>
+            <a:ext cx="1143000" cy="307777"/>
           </a:xfrm>
           <a:prstGeom prst="rect">
             <a:avLst/>
@@ -6831,57 +6245,20 @@
           </a:bodyPr>
           <a:lstStyle/>
           <a:p>
-            <a:pPr marL="137160" indent="-137160">
-              <a:buFont typeface="Arial" panose="020B0604020202020204" pitchFamily="34" charset="0"/>
-              <a:buChar char="•"/>
-            </a:pPr>
-            <a:r>
-              <a:rPr lang="en-US" sz="1400" b="1" i="1" dirty="0"/>
-              <a:t>Accidental data</a:t>
-            </a:r>
-            <a:br>
-              <a:rPr lang="en-US" sz="1400" b="1" i="1" dirty="0"/>
-            </a:br>
-            <a:r>
-              <a:rPr lang="en-US" sz="1400" b="1" i="1" dirty="0"/>
-              <a:t>loss</a:t>
-            </a:r>
-          </a:p>
-          <a:p>
-            <a:pPr marL="137160" indent="-137160">
-              <a:buFont typeface="Arial" panose="020B0604020202020204" pitchFamily="34" charset="0"/>
-              <a:buChar char="•"/>
-            </a:pPr>
-            <a:r>
-              <a:rPr lang="en-US" sz="1400" b="1" i="1" dirty="0"/>
-              <a:t>Malicious updates</a:t>
-            </a:r>
-          </a:p>
-          <a:p>
-            <a:pPr marL="137160" indent="-137160">
-              <a:buFont typeface="Arial" panose="020B0604020202020204" pitchFamily="34" charset="0"/>
-              <a:buChar char="•"/>
-            </a:pPr>
-            <a:r>
-              <a:rPr lang="en-US" sz="1400" b="1" i="1" dirty="0"/>
-              <a:t>Malicious deletes</a:t>
-            </a:r>
-            <a:br>
-              <a:rPr lang="en-US" sz="1400" b="1" i="1" dirty="0"/>
-            </a:br>
-            <a:r>
-              <a:rPr lang="en-US" sz="1400" b="1" i="1" dirty="0"/>
-              <a:t>or rollback</a:t>
-            </a:r>
-          </a:p>
-        </p:txBody>
-      </p:sp>
-      <p:sp>
-        <p:nvSpPr>
-          <p:cNvPr id="124" name="TextBox 123">
-            <a:extLst>
-              <a:ext uri="{FF2B5EF4-FFF2-40B4-BE49-F238E27FC236}">
-                <a16:creationId xmlns:a16="http://schemas.microsoft.com/office/drawing/2014/main" id="{C311BCA0-7701-4152-AB85-2FD9DC3B11D1}"/>
+            <a:pPr algn="ctr"/>
+            <a:r>
+              <a:rPr lang="en-US" sz="1400" i="1" dirty="0"/>
+              <a:t>Provenance</a:t>
+            </a:r>
+          </a:p>
+        </p:txBody>
+      </p:sp>
+      <p:sp>
+        <p:nvSpPr>
+          <p:cNvPr id="135" name="TextBox 134">
+            <a:extLst>
+              <a:ext uri="{FF2B5EF4-FFF2-40B4-BE49-F238E27FC236}">
+                <a16:creationId xmlns:a16="http://schemas.microsoft.com/office/drawing/2014/main" id="{FD1290B0-AA30-2D43-8326-1856F67863B5}"/>
               </a:ext>
             </a:extLst>
           </p:cNvPr>
@@ -6889,8 +6266,8 @@
           <p:nvPr/>
         </p:nvSpPr>
         <p:spPr>
-          <a:xfrm rot="1159330">
-            <a:off x="5559272" y="5670177"/>
+          <a:xfrm>
+            <a:off x="6023963" y="4811886"/>
             <a:ext cx="1562094" cy="307777"/>
           </a:xfrm>
           <a:prstGeom prst="rect">
@@ -6907,7 +6284,7 @@
             <a:pPr algn="ctr"/>
             <a:r>
               <a:rPr lang="en-US" sz="1400" i="1" dirty="0"/>
-              <a:t>Provenance</a:t>
+              <a:t>Current state</a:t>
             </a:r>
           </a:p>
         </p:txBody>

</xml_diff>

<commit_message>
Finished first draft of the new results section.
</commit_message>
<xml_diff>
--- a/paper/figures/BlockchainFlowchart.pptx
+++ b/paper/figures/BlockchainFlowchart.pptx
@@ -4809,7 +4809,7 @@
         </p:nvSpPr>
         <p:spPr>
           <a:xfrm rot="2460000">
-            <a:off x="6233510" y="1533338"/>
+            <a:off x="6370670" y="1659068"/>
             <a:ext cx="1143000" cy="307777"/>
           </a:xfrm>
           <a:prstGeom prst="rect">
@@ -5319,8 +5319,8 @@
         </p:nvSpPr>
         <p:spPr>
           <a:xfrm>
-            <a:off x="9033458" y="1816677"/>
-            <a:ext cx="1371600" cy="738664"/>
+            <a:off x="9033458" y="2022417"/>
+            <a:ext cx="1371600" cy="523220"/>
           </a:xfrm>
           <a:prstGeom prst="rect">
             <a:avLst/>
@@ -5349,14 +5349,7 @@
             </a:pPr>
             <a:r>
               <a:rPr lang="en-US" sz="1400" b="1" i="1" dirty="0"/>
-              <a:t>Undetected</a:t>
-            </a:r>
-            <a:br>
-              <a:rPr lang="en-US" sz="1400" b="1" i="1" dirty="0"/>
-            </a:br>
-            <a:r>
-              <a:rPr lang="en-US" sz="1400" b="1" i="1" dirty="0"/>
-              <a:t>modification</a:t>
+              <a:t>Detect</a:t>
             </a:r>
           </a:p>
         </p:txBody>
@@ -5700,7 +5693,7 @@
         </p:nvSpPr>
         <p:spPr>
           <a:xfrm rot="3660000">
-            <a:off x="6233510" y="2039903"/>
+            <a:off x="6427820" y="2394233"/>
             <a:ext cx="1143000" cy="307777"/>
           </a:xfrm>
           <a:prstGeom prst="rect">
@@ -5874,7 +5867,7 @@
         </p:nvSpPr>
         <p:spPr>
           <a:xfrm rot="2460000">
-            <a:off x="6233510" y="5395699"/>
+            <a:off x="6370670" y="5532859"/>
             <a:ext cx="1143000" cy="307777"/>
           </a:xfrm>
           <a:prstGeom prst="rect">
@@ -5910,8 +5903,8 @@
         </p:nvSpPr>
         <p:spPr>
           <a:xfrm>
-            <a:off x="9033458" y="4381163"/>
-            <a:ext cx="1371600" cy="738664"/>
+            <a:off x="9033458" y="4598333"/>
+            <a:ext cx="1371600" cy="523220"/>
           </a:xfrm>
           <a:prstGeom prst="rect">
             <a:avLst/>
@@ -5940,14 +5933,7 @@
             </a:pPr>
             <a:r>
               <a:rPr lang="en-US" sz="1400" b="1" i="1" dirty="0"/>
-              <a:t>Malicious</a:t>
-            </a:r>
-            <a:br>
-              <a:rPr lang="en-US" sz="1400" b="1" i="1" dirty="0"/>
-            </a:br>
-            <a:r>
-              <a:rPr lang="en-US" sz="1400" b="1" i="1" dirty="0"/>
-              <a:t>updates</a:t>
+              <a:t>Prevent</a:t>
             </a:r>
           </a:p>
         </p:txBody>
@@ -5966,8 +5952,8 @@
         </p:nvSpPr>
         <p:spPr>
           <a:xfrm>
-            <a:off x="9033458" y="3089115"/>
-            <a:ext cx="1371600" cy="738664"/>
+            <a:off x="9033458" y="3306285"/>
+            <a:ext cx="1371600" cy="523220"/>
           </a:xfrm>
           <a:prstGeom prst="rect">
             <a:avLst/>
@@ -5996,14 +5982,7 @@
             </a:pPr>
             <a:r>
               <a:rPr lang="en-US" sz="1400" b="1" i="1" dirty="0"/>
-              <a:t>Undetected</a:t>
-            </a:r>
-            <a:br>
-              <a:rPr lang="en-US" sz="1400" b="1" i="1" dirty="0"/>
-            </a:br>
-            <a:r>
-              <a:rPr lang="en-US" sz="1400" b="1" i="1" dirty="0"/>
-              <a:t>modification</a:t>
+              <a:t>Detect</a:t>
             </a:r>
           </a:p>
         </p:txBody>
@@ -6022,8 +6001,8 @@
         </p:nvSpPr>
         <p:spPr>
           <a:xfrm>
-            <a:off x="9033458" y="5663405"/>
-            <a:ext cx="1371600" cy="738664"/>
+            <a:off x="9033458" y="5880575"/>
+            <a:ext cx="1371600" cy="523220"/>
           </a:xfrm>
           <a:prstGeom prst="rect">
             <a:avLst/>
@@ -6052,14 +6031,7 @@
             </a:pPr>
             <a:r>
               <a:rPr lang="en-US" sz="1400" b="1" i="1" dirty="0"/>
-              <a:t>Malicious</a:t>
-            </a:r>
-            <a:br>
-              <a:rPr lang="en-US" sz="1400" b="1" i="1" dirty="0"/>
-            </a:br>
-            <a:r>
-              <a:rPr lang="en-US" sz="1400" b="1" i="1" dirty="0"/>
-              <a:t>updates</a:t>
+              <a:t>Prevent</a:t>
             </a:r>
           </a:p>
         </p:txBody>

</xml_diff>

<commit_message>
Updates to the result section.
</commit_message>
<xml_diff>
--- a/paper/figures/BlockchainFlowchart.pptx
+++ b/paper/figures/BlockchainFlowchart.pptx
@@ -197,7 +197,7 @@
           <a:p>
             <a:fld id="{02994FF3-6FCA-4117-81FE-5BEF2B3E97C9}" type="datetimeFigureOut">
               <a:rPr lang="en-US" smtClean="0"/>
-              <a:t>9/3/18</a:t>
+              <a:t>3/1/2019</a:t>
             </a:fld>
             <a:endParaRPr lang="en-US"/>
           </a:p>
@@ -719,7 +719,7 @@
           <a:p>
             <a:fld id="{ABCA0093-4CAB-4769-97E2-43E0798F6417}" type="datetimeFigureOut">
               <a:rPr lang="en-US" smtClean="0"/>
-              <a:t>9/3/18</a:t>
+              <a:t>3/1/2019</a:t>
             </a:fld>
             <a:endParaRPr lang="en-US"/>
           </a:p>
@@ -917,7 +917,7 @@
           <a:p>
             <a:fld id="{ABCA0093-4CAB-4769-97E2-43E0798F6417}" type="datetimeFigureOut">
               <a:rPr lang="en-US" smtClean="0"/>
-              <a:t>9/3/18</a:t>
+              <a:t>3/1/2019</a:t>
             </a:fld>
             <a:endParaRPr lang="en-US"/>
           </a:p>
@@ -1125,7 +1125,7 @@
           <a:p>
             <a:fld id="{ABCA0093-4CAB-4769-97E2-43E0798F6417}" type="datetimeFigureOut">
               <a:rPr lang="en-US" smtClean="0"/>
-              <a:t>9/3/18</a:t>
+              <a:t>3/1/2019</a:t>
             </a:fld>
             <a:endParaRPr lang="en-US"/>
           </a:p>
@@ -1323,7 +1323,7 @@
           <a:p>
             <a:fld id="{ABCA0093-4CAB-4769-97E2-43E0798F6417}" type="datetimeFigureOut">
               <a:rPr lang="en-US" smtClean="0"/>
-              <a:t>9/3/18</a:t>
+              <a:t>3/1/2019</a:t>
             </a:fld>
             <a:endParaRPr lang="en-US"/>
           </a:p>
@@ -1598,7 +1598,7 @@
           <a:p>
             <a:fld id="{ABCA0093-4CAB-4769-97E2-43E0798F6417}" type="datetimeFigureOut">
               <a:rPr lang="en-US" smtClean="0"/>
-              <a:t>9/3/18</a:t>
+              <a:t>3/1/2019</a:t>
             </a:fld>
             <a:endParaRPr lang="en-US"/>
           </a:p>
@@ -1863,7 +1863,7 @@
           <a:p>
             <a:fld id="{ABCA0093-4CAB-4769-97E2-43E0798F6417}" type="datetimeFigureOut">
               <a:rPr lang="en-US" smtClean="0"/>
-              <a:t>9/3/18</a:t>
+              <a:t>3/1/2019</a:t>
             </a:fld>
             <a:endParaRPr lang="en-US"/>
           </a:p>
@@ -2275,7 +2275,7 @@
           <a:p>
             <a:fld id="{ABCA0093-4CAB-4769-97E2-43E0798F6417}" type="datetimeFigureOut">
               <a:rPr lang="en-US" smtClean="0"/>
-              <a:t>9/3/18</a:t>
+              <a:t>3/1/2019</a:t>
             </a:fld>
             <a:endParaRPr lang="en-US"/>
           </a:p>
@@ -2416,7 +2416,7 @@
           <a:p>
             <a:fld id="{ABCA0093-4CAB-4769-97E2-43E0798F6417}" type="datetimeFigureOut">
               <a:rPr lang="en-US" smtClean="0"/>
-              <a:t>9/3/18</a:t>
+              <a:t>3/1/2019</a:t>
             </a:fld>
             <a:endParaRPr lang="en-US"/>
           </a:p>
@@ -2529,7 +2529,7 @@
           <a:p>
             <a:fld id="{ABCA0093-4CAB-4769-97E2-43E0798F6417}" type="datetimeFigureOut">
               <a:rPr lang="en-US" smtClean="0"/>
-              <a:t>9/3/18</a:t>
+              <a:t>3/1/2019</a:t>
             </a:fld>
             <a:endParaRPr lang="en-US"/>
           </a:p>
@@ -2840,7 +2840,7 @@
           <a:p>
             <a:fld id="{ABCA0093-4CAB-4769-97E2-43E0798F6417}" type="datetimeFigureOut">
               <a:rPr lang="en-US" smtClean="0"/>
-              <a:t>9/3/18</a:t>
+              <a:t>3/1/2019</a:t>
             </a:fld>
             <a:endParaRPr lang="en-US"/>
           </a:p>
@@ -3128,7 +3128,7 @@
           <a:p>
             <a:fld id="{ABCA0093-4CAB-4769-97E2-43E0798F6417}" type="datetimeFigureOut">
               <a:rPr lang="en-US" smtClean="0"/>
-              <a:t>9/3/18</a:t>
+              <a:t>3/1/2019</a:t>
             </a:fld>
             <a:endParaRPr lang="en-US"/>
           </a:p>
@@ -3369,7 +3369,7 @@
           <a:p>
             <a:fld id="{ABCA0093-4CAB-4769-97E2-43E0798F6417}" type="datetimeFigureOut">
               <a:rPr lang="en-US" smtClean="0"/>
-              <a:t>9/3/18</a:t>
+              <a:t>3/1/2019</a:t>
             </a:fld>
             <a:endParaRPr lang="en-US"/>
           </a:p>
@@ -5254,7 +5254,7 @@
             <a:pPr algn="ctr"/>
             <a:r>
               <a:rPr lang="en-US" sz="1400" dirty="0"/>
-              <a:t>Decentralized</a:t>
+              <a:t>Shared</a:t>
             </a:r>
           </a:p>
         </p:txBody>
@@ -6112,7 +6112,7 @@
             <a:pPr algn="ctr"/>
             <a:r>
               <a:rPr lang="en-US" sz="1400" dirty="0"/>
-              <a:t>Centralized</a:t>
+              <a:t>Singular</a:t>
             </a:r>
           </a:p>
         </p:txBody>

</xml_diff>

<commit_message>
Tweaks to the appendix.
</commit_message>
<xml_diff>
--- a/paper/figures/BlockchainFlowchart.pptx
+++ b/paper/figures/BlockchainFlowchart.pptx
@@ -3817,7 +3817,7 @@
             <a:pPr algn="ctr"/>
             <a:r>
               <a:rPr lang="en-US" dirty="0"/>
-              <a:t>What is the governance model?</a:t>
+              <a:t>What is the operational model?</a:t>
             </a:r>
           </a:p>
         </p:txBody>
@@ -4065,7 +4065,7 @@
         </p:nvSpPr>
         <p:spPr>
           <a:xfrm>
-            <a:off x="4616366" y="1078627"/>
+            <a:off x="4611824" y="1069042"/>
             <a:ext cx="1463040" cy="369332"/>
           </a:xfrm>
           <a:prstGeom prst="rect">
@@ -4191,12 +4191,12 @@
         <p:spPr>
           <a:xfrm>
             <a:off x="3165158" y="1249764"/>
-            <a:ext cx="1451208" cy="13529"/>
+            <a:ext cx="1446666" cy="3944"/>
           </a:xfrm>
           <a:prstGeom prst="straightConnector1">
             <a:avLst/>
           </a:prstGeom>
-          <a:ln>
+          <a:ln w="12700">
             <a:solidFill>
               <a:schemeClr val="tx1"/>
             </a:solidFill>
@@ -4342,7 +4342,7 @@
           <a:prstGeom prst="straightConnector1">
             <a:avLst/>
           </a:prstGeom>
-          <a:ln>
+          <a:ln w="12700">
             <a:solidFill>
               <a:schemeClr val="tx1"/>
             </a:solidFill>
@@ -4492,7 +4492,7 @@
           <a:prstGeom prst="straightConnector1">
             <a:avLst/>
           </a:prstGeom>
-          <a:ln>
+          <a:ln w="12700">
             <a:solidFill>
               <a:schemeClr val="tx1"/>
             </a:solidFill>
@@ -4538,7 +4538,7 @@
           <a:prstGeom prst="straightConnector1">
             <a:avLst/>
           </a:prstGeom>
-          <a:ln>
+          <a:ln w="12700">
             <a:solidFill>
               <a:schemeClr val="tx1"/>
             </a:solidFill>
@@ -4620,7 +4620,7 @@
           <a:prstGeom prst="straightConnector1">
             <a:avLst/>
           </a:prstGeom>
-          <a:ln>
+          <a:ln w="12700">
             <a:solidFill>
               <a:schemeClr val="tx1"/>
             </a:solidFill>
@@ -4767,13 +4767,13 @@
         </p:nvCxnSpPr>
         <p:spPr>
           <a:xfrm>
-            <a:off x="6079406" y="1263293"/>
-            <a:ext cx="1455749" cy="1286963"/>
+            <a:off x="6074864" y="1253708"/>
+            <a:ext cx="1460291" cy="1296548"/>
           </a:xfrm>
           <a:prstGeom prst="straightConnector1">
             <a:avLst/>
           </a:prstGeom>
-          <a:ln>
+          <a:ln w="12700">
             <a:solidFill>
               <a:schemeClr val="tx1"/>
             </a:solidFill>
@@ -5201,7 +5201,7 @@
           <a:prstGeom prst="straightConnector1">
             <a:avLst/>
           </a:prstGeom>
-          <a:ln>
+          <a:ln w="12700">
             <a:solidFill>
               <a:schemeClr val="tx1"/>
             </a:solidFill>
@@ -5283,7 +5283,7 @@
           <a:prstGeom prst="straightConnector1">
             <a:avLst/>
           </a:prstGeom>
-          <a:ln>
+          <a:ln w="12700">
             <a:solidFill>
               <a:schemeClr val="tx1"/>
             </a:solidFill>
@@ -5378,7 +5378,7 @@
           <a:prstGeom prst="straightConnector1">
             <a:avLst/>
           </a:prstGeom>
-          <a:ln>
+          <a:ln w="12700">
             <a:solidFill>
               <a:schemeClr val="tx1"/>
             </a:solidFill>
@@ -5423,7 +5423,7 @@
           <a:prstGeom prst="straightConnector1">
             <a:avLst/>
           </a:prstGeom>
-          <a:ln>
+          <a:ln w="12700">
             <a:solidFill>
               <a:schemeClr val="tx1"/>
             </a:solidFill>
@@ -5569,13 +5569,13 @@
         </p:nvCxnSpPr>
         <p:spPr>
           <a:xfrm>
-            <a:off x="6079406" y="1263293"/>
-            <a:ext cx="1451208" cy="0"/>
+            <a:off x="6074864" y="1253708"/>
+            <a:ext cx="1455750" cy="0"/>
           </a:xfrm>
           <a:prstGeom prst="straightConnector1">
             <a:avLst/>
           </a:prstGeom>
-          <a:ln>
+          <a:ln w="12700">
             <a:solidFill>
               <a:schemeClr val="tx1"/>
             </a:solidFill>
@@ -5651,13 +5651,13 @@
         </p:nvCxnSpPr>
         <p:spPr>
           <a:xfrm>
-            <a:off x="6079406" y="1263293"/>
-            <a:ext cx="1455749" cy="2574109"/>
+            <a:off x="6074864" y="1253708"/>
+            <a:ext cx="1460291" cy="2583694"/>
           </a:xfrm>
           <a:prstGeom prst="straightConnector1">
             <a:avLst/>
           </a:prstGeom>
-          <a:ln>
+          <a:ln w="12700">
             <a:solidFill>
               <a:schemeClr val="tx1"/>
             </a:solidFill>
@@ -5739,7 +5739,7 @@
           <a:prstGeom prst="straightConnector1">
             <a:avLst/>
           </a:prstGeom>
-          <a:ln>
+          <a:ln w="12700">
             <a:solidFill>
               <a:schemeClr val="tx1"/>
             </a:solidFill>
@@ -5785,7 +5785,7 @@
           <a:prstGeom prst="straightConnector1">
             <a:avLst/>
           </a:prstGeom>
-          <a:ln>
+          <a:ln w="12700">
             <a:solidFill>
               <a:schemeClr val="tx1"/>
             </a:solidFill>
@@ -5831,7 +5831,7 @@
           <a:prstGeom prst="straightConnector1">
             <a:avLst/>
           </a:prstGeom>
-          <a:ln>
+          <a:ln w="12700">
             <a:solidFill>
               <a:schemeClr val="tx1"/>
             </a:solidFill>
@@ -6059,7 +6059,7 @@
           <a:prstGeom prst="straightConnector1">
             <a:avLst/>
           </a:prstGeom>
-          <a:ln>
+          <a:ln w="12700">
             <a:solidFill>
               <a:schemeClr val="tx1"/>
             </a:solidFill>

</xml_diff>